<commit_message>
Notes for architecture presentation
more updates to presentation/notes
</commit_message>
<xml_diff>
--- a/Notification Central Arch Pres.pptx
+++ b/Notification Central Arch Pres.pptx
@@ -1,30 +1,31 @@
 
 <file path=ppt/presentation.xml><?xml version="1.0" encoding="utf-8"?>
-<p:presentation xmlns:a="http://schemas.openxmlformats.org/drawingml/2006/main" xmlns:r="http://schemas.openxmlformats.org/officeDocument/2006/relationships" xmlns:mc="http://schemas.openxmlformats.org/markup-compatibility/2006" xmlns:mv="urn:schemas-microsoft-com:mac:vml" xmlns:p="http://schemas.openxmlformats.org/presentationml/2006/main" xmlns:c="http://schemas.openxmlformats.org/drawingml/2006/chart" xmlns:dgm="http://schemas.openxmlformats.org/drawingml/2006/diagram" xmlns:o="urn:schemas-microsoft-com:office:office" xmlns:v="urn:schemas-microsoft-com:vml" xmlns:pvml="urn:schemas-microsoft-com:office:powerpoint" xmlns:com="http://schemas.openxmlformats.org/drawingml/2006/compatibility" xmlns:p14="http://schemas.microsoft.com/office/powerpoint/2010/main" xmlns:p15="http://schemas.microsoft.com/office/powerpoint/2012/main" xmlns:ahyp="http://schemas.microsoft.com/office/drawing/2018/hyperlinkcolor" autoCompressPictures="0" embedTrueTypeFonts="1" strictFirstAndLastChars="0" saveSubsetFonts="1">
+<p:presentation xmlns:a="http://schemas.openxmlformats.org/drawingml/2006/main" xmlns:r="http://schemas.openxmlformats.org/officeDocument/2006/relationships" xmlns:p="http://schemas.openxmlformats.org/presentationml/2006/main" strictFirstAndLastChars="0" embedTrueTypeFonts="1" saveSubsetFonts="1" autoCompressPictures="0">
   <p:sldMasterIdLst>
-    <p:sldMasterId id="2147483659" r:id="rId4"/>
+    <p:sldMasterId id="2147483659" r:id="rId1"/>
   </p:sldMasterIdLst>
   <p:notesMasterIdLst>
-    <p:notesMasterId r:id="rId5"/>
+    <p:notesMasterId r:id="rId6"/>
   </p:notesMasterIdLst>
   <p:sldIdLst>
-    <p:sldId id="256" r:id="rId6"/>
-    <p:sldId id="257" r:id="rId7"/>
-    <p:sldId id="258" r:id="rId8"/>
+    <p:sldId id="256" r:id="rId2"/>
+    <p:sldId id="257" r:id="rId3"/>
+    <p:sldId id="258" r:id="rId4"/>
+    <p:sldId id="259" r:id="rId5"/>
   </p:sldIdLst>
-  <p:sldSz cy="5143500" cx="9144000"/>
+  <p:sldSz cx="9144000" cy="5143500" type="screen16x9"/>
   <p:notesSz cx="6858000" cy="9144000"/>
   <p:embeddedFontLst>
     <p:embeddedFont>
-      <p:font typeface="Lato"/>
-      <p:regular r:id="rId9"/>
-      <p:bold r:id="rId10"/>
-      <p:italic r:id="rId11"/>
-      <p:boldItalic r:id="rId12"/>
+      <p:font typeface="Lato" panose="020B0604020202020204" charset="0"/>
+      <p:regular r:id="rId7"/>
+      <p:bold r:id="rId8"/>
+      <p:italic r:id="rId9"/>
+      <p:boldItalic r:id="rId10"/>
     </p:embeddedFont>
   </p:embeddedFontLst>
   <p:defaultTextStyle>
-    <a:defPPr lvl="0" marR="0" rtl="0" algn="l">
+    <a:defPPr marR="0" lvl="0" algn="l" rtl="0">
       <a:lnSpc>
         <a:spcPct val="100000"/>
       </a:lnSpc>
@@ -35,7 +36,7 @@
         <a:spcPts val="0"/>
       </a:spcAft>
     </a:defPPr>
-    <a:lvl1pPr lvl="0" marR="0" rtl="0" algn="l">
+    <a:lvl1pPr marR="0" lvl="0" algn="l" rtl="0">
       <a:lnSpc>
         <a:spcPct val="100000"/>
       </a:lnSpc>
@@ -49,7 +50,7 @@
         <a:srgbClr val="000000"/>
       </a:buClr>
       <a:buFont typeface="Arial"/>
-      <a:defRPr b="0" i="0" sz="1400" u="none" cap="none" strike="noStrike">
+      <a:defRPr sz="1400" b="0" i="0" u="none" strike="noStrike" cap="none">
         <a:solidFill>
           <a:srgbClr val="000000"/>
         </a:solidFill>
@@ -59,7 +60,7 @@
         <a:sym typeface="Arial"/>
       </a:defRPr>
     </a:lvl1pPr>
-    <a:lvl2pPr lvl="1" marR="0" rtl="0" algn="l">
+    <a:lvl2pPr marR="0" lvl="1" algn="l" rtl="0">
       <a:lnSpc>
         <a:spcPct val="100000"/>
       </a:lnSpc>
@@ -73,7 +74,7 @@
         <a:srgbClr val="000000"/>
       </a:buClr>
       <a:buFont typeface="Arial"/>
-      <a:defRPr b="0" i="0" sz="1400" u="none" cap="none" strike="noStrike">
+      <a:defRPr sz="1400" b="0" i="0" u="none" strike="noStrike" cap="none">
         <a:solidFill>
           <a:srgbClr val="000000"/>
         </a:solidFill>
@@ -83,7 +84,7 @@
         <a:sym typeface="Arial"/>
       </a:defRPr>
     </a:lvl2pPr>
-    <a:lvl3pPr lvl="2" marR="0" rtl="0" algn="l">
+    <a:lvl3pPr marR="0" lvl="2" algn="l" rtl="0">
       <a:lnSpc>
         <a:spcPct val="100000"/>
       </a:lnSpc>
@@ -97,7 +98,7 @@
         <a:srgbClr val="000000"/>
       </a:buClr>
       <a:buFont typeface="Arial"/>
-      <a:defRPr b="0" i="0" sz="1400" u="none" cap="none" strike="noStrike">
+      <a:defRPr sz="1400" b="0" i="0" u="none" strike="noStrike" cap="none">
         <a:solidFill>
           <a:srgbClr val="000000"/>
         </a:solidFill>
@@ -107,7 +108,7 @@
         <a:sym typeface="Arial"/>
       </a:defRPr>
     </a:lvl3pPr>
-    <a:lvl4pPr lvl="3" marR="0" rtl="0" algn="l">
+    <a:lvl4pPr marR="0" lvl="3" algn="l" rtl="0">
       <a:lnSpc>
         <a:spcPct val="100000"/>
       </a:lnSpc>
@@ -121,7 +122,7 @@
         <a:srgbClr val="000000"/>
       </a:buClr>
       <a:buFont typeface="Arial"/>
-      <a:defRPr b="0" i="0" sz="1400" u="none" cap="none" strike="noStrike">
+      <a:defRPr sz="1400" b="0" i="0" u="none" strike="noStrike" cap="none">
         <a:solidFill>
           <a:srgbClr val="000000"/>
         </a:solidFill>
@@ -131,7 +132,7 @@
         <a:sym typeface="Arial"/>
       </a:defRPr>
     </a:lvl4pPr>
-    <a:lvl5pPr lvl="4" marR="0" rtl="0" algn="l">
+    <a:lvl5pPr marR="0" lvl="4" algn="l" rtl="0">
       <a:lnSpc>
         <a:spcPct val="100000"/>
       </a:lnSpc>
@@ -145,7 +146,7 @@
         <a:srgbClr val="000000"/>
       </a:buClr>
       <a:buFont typeface="Arial"/>
-      <a:defRPr b="0" i="0" sz="1400" u="none" cap="none" strike="noStrike">
+      <a:defRPr sz="1400" b="0" i="0" u="none" strike="noStrike" cap="none">
         <a:solidFill>
           <a:srgbClr val="000000"/>
         </a:solidFill>
@@ -155,7 +156,7 @@
         <a:sym typeface="Arial"/>
       </a:defRPr>
     </a:lvl5pPr>
-    <a:lvl6pPr lvl="5" marR="0" rtl="0" algn="l">
+    <a:lvl6pPr marR="0" lvl="5" algn="l" rtl="0">
       <a:lnSpc>
         <a:spcPct val="100000"/>
       </a:lnSpc>
@@ -169,7 +170,7 @@
         <a:srgbClr val="000000"/>
       </a:buClr>
       <a:buFont typeface="Arial"/>
-      <a:defRPr b="0" i="0" sz="1400" u="none" cap="none" strike="noStrike">
+      <a:defRPr sz="1400" b="0" i="0" u="none" strike="noStrike" cap="none">
         <a:solidFill>
           <a:srgbClr val="000000"/>
         </a:solidFill>
@@ -179,7 +180,7 @@
         <a:sym typeface="Arial"/>
       </a:defRPr>
     </a:lvl6pPr>
-    <a:lvl7pPr lvl="6" marR="0" rtl="0" algn="l">
+    <a:lvl7pPr marR="0" lvl="6" algn="l" rtl="0">
       <a:lnSpc>
         <a:spcPct val="100000"/>
       </a:lnSpc>
@@ -193,7 +194,7 @@
         <a:srgbClr val="000000"/>
       </a:buClr>
       <a:buFont typeface="Arial"/>
-      <a:defRPr b="0" i="0" sz="1400" u="none" cap="none" strike="noStrike">
+      <a:defRPr sz="1400" b="0" i="0" u="none" strike="noStrike" cap="none">
         <a:solidFill>
           <a:srgbClr val="000000"/>
         </a:solidFill>
@@ -203,7 +204,7 @@
         <a:sym typeface="Arial"/>
       </a:defRPr>
     </a:lvl7pPr>
-    <a:lvl8pPr lvl="7" marR="0" rtl="0" algn="l">
+    <a:lvl8pPr marR="0" lvl="7" algn="l" rtl="0">
       <a:lnSpc>
         <a:spcPct val="100000"/>
       </a:lnSpc>
@@ -217,7 +218,7 @@
         <a:srgbClr val="000000"/>
       </a:buClr>
       <a:buFont typeface="Arial"/>
-      <a:defRPr b="0" i="0" sz="1400" u="none" cap="none" strike="noStrike">
+      <a:defRPr sz="1400" b="0" i="0" u="none" strike="noStrike" cap="none">
         <a:solidFill>
           <a:srgbClr val="000000"/>
         </a:solidFill>
@@ -227,7 +228,7 @@
         <a:sym typeface="Arial"/>
       </a:defRPr>
     </a:lvl8pPr>
-    <a:lvl9pPr lvl="8" marR="0" rtl="0" algn="l">
+    <a:lvl9pPr marR="0" lvl="8" algn="l" rtl="0">
       <a:lnSpc>
         <a:spcPct val="100000"/>
       </a:lnSpc>
@@ -241,7 +242,7 @@
         <a:srgbClr val="000000"/>
       </a:buClr>
       <a:buFont typeface="Arial"/>
-      <a:defRPr b="0" i="0" sz="1400" u="none" cap="none" strike="noStrike">
+      <a:defRPr sz="1400" b="0" i="0" u="none" strike="noStrike" cap="none">
         <a:solidFill>
           <a:srgbClr val="000000"/>
         </a:solidFill>
@@ -254,7 +255,7 @@
   </p:defaultTextStyle>
   <p:extLst>
     <p:ext uri="{EFAFB233-063F-42B5-8137-9DF3F51BA10A}">
-      <p15:sldGuideLst>
+      <p15:sldGuideLst xmlns:p15="http://schemas.microsoft.com/office/powerpoint/2012/main">
         <p15:guide id="1" orient="horz" pos="1620">
           <p15:clr>
             <a:srgbClr val="A4A3A4"/>
@@ -272,11 +273,16 @@
 </file>
 
 <file path=ppt/notesMasters/notesMaster1.xml><?xml version="1.0" encoding="utf-8"?>
-<p:notesMaster xmlns:a="http://schemas.openxmlformats.org/drawingml/2006/main" xmlns:r="http://schemas.openxmlformats.org/officeDocument/2006/relationships" xmlns:mc="http://schemas.openxmlformats.org/markup-compatibility/2006" xmlns:mv="urn:schemas-microsoft-com:mac:vml" xmlns:p="http://schemas.openxmlformats.org/presentationml/2006/main" xmlns:c="http://schemas.openxmlformats.org/drawingml/2006/chart" xmlns:dgm="http://schemas.openxmlformats.org/drawingml/2006/diagram" xmlns:o="urn:schemas-microsoft-com:office:office" xmlns:v="urn:schemas-microsoft-com:vml" xmlns:pvml="urn:schemas-microsoft-com:office:powerpoint" xmlns:com="http://schemas.openxmlformats.org/drawingml/2006/compatibility" xmlns:p14="http://schemas.microsoft.com/office/powerpoint/2010/main" xmlns:p15="http://schemas.microsoft.com/office/powerpoint/2012/main" xmlns:ahyp="http://schemas.microsoft.com/office/drawing/2018/hyperlinkcolor">
+<p:notesMaster xmlns:a="http://schemas.openxmlformats.org/drawingml/2006/main" xmlns:r="http://schemas.openxmlformats.org/officeDocument/2006/relationships" xmlns:p="http://schemas.openxmlformats.org/presentationml/2006/main">
   <p:cSld>
+    <p:bg>
+      <p:bgRef idx="1001">
+        <a:schemeClr val="bg1"/>
+      </p:bgRef>
+    </p:bg>
     <p:spTree>
       <p:nvGrpSpPr>
-        <p:cNvPr id="2" name="Shape 2"/>
+        <p:cNvPr id="1" name="Shape 2"/>
         <p:cNvGrpSpPr/>
         <p:nvPr/>
       </p:nvGrpSpPr>
@@ -291,9 +297,11 @@
       <p:sp>
         <p:nvSpPr>
           <p:cNvPr id="3" name="Google Shape;3;n"/>
-          <p:cNvSpPr/>
+          <p:cNvSpPr>
+            <a:spLocks noGrp="1" noRot="1" noChangeAspect="1"/>
+          </p:cNvSpPr>
           <p:nvPr>
-            <p:ph idx="2" type="sldImg"/>
+            <p:ph type="sldImg" idx="2"/>
           </p:nvPr>
         </p:nvSpPr>
         <p:spPr>
@@ -302,9 +310,13 @@
             <a:ext cx="6096075" cy="3429000"/>
           </a:xfrm>
           <a:custGeom>
-            <a:rect b="b" l="l" r="r" t="t"/>
+            <a:avLst/>
+            <a:gdLst/>
+            <a:ahLst/>
+            <a:cxnLst/>
+            <a:rect l="l" t="t" r="r" b="b"/>
             <a:pathLst>
-              <a:path extrusionOk="0" h="120000" w="120000">
+              <a:path w="120000" h="120000" extrusionOk="0">
                 <a:moveTo>
                   <a:pt x="0" y="0"/>
                 </a:moveTo>
@@ -322,23 +334,25 @@
             </a:pathLst>
           </a:custGeom>
           <a:noFill/>
-          <a:ln cap="flat" cmpd="sng" w="9525">
+          <a:ln w="9525" cap="flat" cmpd="sng">
             <a:solidFill>
               <a:srgbClr val="000000"/>
             </a:solidFill>
             <a:prstDash val="solid"/>
             <a:round/>
-            <a:headEnd len="sm" w="sm" type="none"/>
-            <a:tailEnd len="sm" w="sm" type="none"/>
+            <a:headEnd type="none" w="sm" len="sm"/>
+            <a:tailEnd type="none" w="sm" len="sm"/>
           </a:ln>
         </p:spPr>
       </p:sp>
       <p:sp>
         <p:nvSpPr>
           <p:cNvPr id="4" name="Google Shape;4;n"/>
-          <p:cNvSpPr txBox="1"/>
+          <p:cNvSpPr txBox="1">
+            <a:spLocks noGrp="1"/>
+          </p:cNvSpPr>
           <p:nvPr>
-            <p:ph idx="1" type="body"/>
+            <p:ph type="body" idx="1"/>
           </p:nvPr>
         </p:nvSpPr>
         <p:spPr>
@@ -355,11 +369,11 @@
           </a:ln>
         </p:spPr>
         <p:txBody>
-          <a:bodyPr anchorCtr="0" anchor="t" bIns="91425" lIns="91425" spcFirstLastPara="1" rIns="91425" wrap="square" tIns="91425">
+          <a:bodyPr spcFirstLastPara="1" wrap="square" lIns="91425" tIns="91425" rIns="91425" bIns="91425" anchor="t" anchorCtr="0">
             <a:noAutofit/>
           </a:bodyPr>
           <a:lstStyle>
-            <a:lvl1pPr indent="-298450" lvl="0" marL="457200">
+            <a:lvl1pPr marL="457200" lvl="0" indent="-298450">
               <a:spcBef>
                 <a:spcPts val="0"/>
               </a:spcBef>
@@ -370,7 +384,7 @@
               <a:buChar char="●"/>
               <a:defRPr sz="1100"/>
             </a:lvl1pPr>
-            <a:lvl2pPr indent="-298450" lvl="1" marL="914400">
+            <a:lvl2pPr marL="914400" lvl="1" indent="-298450">
               <a:spcBef>
                 <a:spcPts val="0"/>
               </a:spcBef>
@@ -381,7 +395,7 @@
               <a:buChar char="○"/>
               <a:defRPr sz="1100"/>
             </a:lvl2pPr>
-            <a:lvl3pPr indent="-298450" lvl="2" marL="1371600">
+            <a:lvl3pPr marL="1371600" lvl="2" indent="-298450">
               <a:spcBef>
                 <a:spcPts val="0"/>
               </a:spcBef>
@@ -392,7 +406,7 @@
               <a:buChar char="■"/>
               <a:defRPr sz="1100"/>
             </a:lvl3pPr>
-            <a:lvl4pPr indent="-298450" lvl="3" marL="1828800">
+            <a:lvl4pPr marL="1828800" lvl="3" indent="-298450">
               <a:spcBef>
                 <a:spcPts val="0"/>
               </a:spcBef>
@@ -403,7 +417,7 @@
               <a:buChar char="●"/>
               <a:defRPr sz="1100"/>
             </a:lvl4pPr>
-            <a:lvl5pPr indent="-298450" lvl="4" marL="2286000">
+            <a:lvl5pPr marL="2286000" lvl="4" indent="-298450">
               <a:spcBef>
                 <a:spcPts val="0"/>
               </a:spcBef>
@@ -414,7 +428,7 @@
               <a:buChar char="○"/>
               <a:defRPr sz="1100"/>
             </a:lvl5pPr>
-            <a:lvl6pPr indent="-298450" lvl="5" marL="2743200">
+            <a:lvl6pPr marL="2743200" lvl="5" indent="-298450">
               <a:spcBef>
                 <a:spcPts val="0"/>
               </a:spcBef>
@@ -425,7 +439,7 @@
               <a:buChar char="■"/>
               <a:defRPr sz="1100"/>
             </a:lvl6pPr>
-            <a:lvl7pPr indent="-298450" lvl="6" marL="3200400">
+            <a:lvl7pPr marL="3200400" lvl="6" indent="-298450">
               <a:spcBef>
                 <a:spcPts val="0"/>
               </a:spcBef>
@@ -436,7 +450,7 @@
               <a:buChar char="●"/>
               <a:defRPr sz="1100"/>
             </a:lvl7pPr>
-            <a:lvl8pPr indent="-298450" lvl="7" marL="3657600">
+            <a:lvl8pPr marL="3657600" lvl="7" indent="-298450">
               <a:spcBef>
                 <a:spcPts val="0"/>
               </a:spcBef>
@@ -447,7 +461,7 @@
               <a:buChar char="○"/>
               <a:defRPr sz="1100"/>
             </a:lvl8pPr>
-            <a:lvl9pPr indent="-298450" lvl="8" marL="4114800">
+            <a:lvl9pPr marL="4114800" lvl="8" indent="-298450">
               <a:spcBef>
                 <a:spcPts val="0"/>
               </a:spcBef>
@@ -459,14 +473,16 @@
               <a:defRPr sz="1100"/>
             </a:lvl9pPr>
           </a:lstStyle>
-          <a:p/>
+          <a:p>
+            <a:endParaRPr/>
+          </a:p>
         </p:txBody>
       </p:sp>
     </p:spTree>
   </p:cSld>
-  <p:clrMap accent1="accent1" accent2="accent2" accent3="accent3" accent4="accent4" accent5="accent5" accent6="accent6" bg1="lt1" bg2="dk2" tx1="dk1" tx2="lt2" folHlink="folHlink" hlink="hlink"/>
+  <p:clrMap bg1="lt1" tx1="dk1" bg2="dk2" tx2="lt2" accent1="accent1" accent2="accent2" accent3="accent3" accent4="accent4" accent5="accent5" accent6="accent6" hlink="hlink" folHlink="folHlink"/>
   <p:notesStyle>
-    <a:defPPr lvl="0" marR="0" rtl="0" algn="l">
+    <a:defPPr marR="0" lvl="0" algn="l" rtl="0">
       <a:lnSpc>
         <a:spcPct val="100000"/>
       </a:lnSpc>
@@ -477,7 +493,7 @@
         <a:spcPts val="0"/>
       </a:spcAft>
     </a:defPPr>
-    <a:lvl1pPr lvl="0" marR="0" rtl="0" algn="l">
+    <a:lvl1pPr marR="0" lvl="0" algn="l" rtl="0">
       <a:lnSpc>
         <a:spcPct val="100000"/>
       </a:lnSpc>
@@ -491,7 +507,7 @@
         <a:srgbClr val="000000"/>
       </a:buClr>
       <a:buFont typeface="Arial"/>
-      <a:defRPr b="0" i="0" sz="1400" u="none" cap="none" strike="noStrike">
+      <a:defRPr sz="1400" b="0" i="0" u="none" strike="noStrike" cap="none">
         <a:solidFill>
           <a:srgbClr val="000000"/>
         </a:solidFill>
@@ -501,7 +517,7 @@
         <a:sym typeface="Arial"/>
       </a:defRPr>
     </a:lvl1pPr>
-    <a:lvl2pPr lvl="1" marR="0" rtl="0" algn="l">
+    <a:lvl2pPr marR="0" lvl="1" algn="l" rtl="0">
       <a:lnSpc>
         <a:spcPct val="100000"/>
       </a:lnSpc>
@@ -515,7 +531,7 @@
         <a:srgbClr val="000000"/>
       </a:buClr>
       <a:buFont typeface="Arial"/>
-      <a:defRPr b="0" i="0" sz="1400" u="none" cap="none" strike="noStrike">
+      <a:defRPr sz="1400" b="0" i="0" u="none" strike="noStrike" cap="none">
         <a:solidFill>
           <a:srgbClr val="000000"/>
         </a:solidFill>
@@ -525,7 +541,7 @@
         <a:sym typeface="Arial"/>
       </a:defRPr>
     </a:lvl2pPr>
-    <a:lvl3pPr lvl="2" marR="0" rtl="0" algn="l">
+    <a:lvl3pPr marR="0" lvl="2" algn="l" rtl="0">
       <a:lnSpc>
         <a:spcPct val="100000"/>
       </a:lnSpc>
@@ -539,7 +555,7 @@
         <a:srgbClr val="000000"/>
       </a:buClr>
       <a:buFont typeface="Arial"/>
-      <a:defRPr b="0" i="0" sz="1400" u="none" cap="none" strike="noStrike">
+      <a:defRPr sz="1400" b="0" i="0" u="none" strike="noStrike" cap="none">
         <a:solidFill>
           <a:srgbClr val="000000"/>
         </a:solidFill>
@@ -549,7 +565,7 @@
         <a:sym typeface="Arial"/>
       </a:defRPr>
     </a:lvl3pPr>
-    <a:lvl4pPr lvl="3" marR="0" rtl="0" algn="l">
+    <a:lvl4pPr marR="0" lvl="3" algn="l" rtl="0">
       <a:lnSpc>
         <a:spcPct val="100000"/>
       </a:lnSpc>
@@ -563,7 +579,7 @@
         <a:srgbClr val="000000"/>
       </a:buClr>
       <a:buFont typeface="Arial"/>
-      <a:defRPr b="0" i="0" sz="1400" u="none" cap="none" strike="noStrike">
+      <a:defRPr sz="1400" b="0" i="0" u="none" strike="noStrike" cap="none">
         <a:solidFill>
           <a:srgbClr val="000000"/>
         </a:solidFill>
@@ -573,7 +589,7 @@
         <a:sym typeface="Arial"/>
       </a:defRPr>
     </a:lvl4pPr>
-    <a:lvl5pPr lvl="4" marR="0" rtl="0" algn="l">
+    <a:lvl5pPr marR="0" lvl="4" algn="l" rtl="0">
       <a:lnSpc>
         <a:spcPct val="100000"/>
       </a:lnSpc>
@@ -587,7 +603,7 @@
         <a:srgbClr val="000000"/>
       </a:buClr>
       <a:buFont typeface="Arial"/>
-      <a:defRPr b="0" i="0" sz="1400" u="none" cap="none" strike="noStrike">
+      <a:defRPr sz="1400" b="0" i="0" u="none" strike="noStrike" cap="none">
         <a:solidFill>
           <a:srgbClr val="000000"/>
         </a:solidFill>
@@ -597,7 +613,7 @@
         <a:sym typeface="Arial"/>
       </a:defRPr>
     </a:lvl5pPr>
-    <a:lvl6pPr lvl="5" marR="0" rtl="0" algn="l">
+    <a:lvl6pPr marR="0" lvl="5" algn="l" rtl="0">
       <a:lnSpc>
         <a:spcPct val="100000"/>
       </a:lnSpc>
@@ -611,7 +627,7 @@
         <a:srgbClr val="000000"/>
       </a:buClr>
       <a:buFont typeface="Arial"/>
-      <a:defRPr b="0" i="0" sz="1400" u="none" cap="none" strike="noStrike">
+      <a:defRPr sz="1400" b="0" i="0" u="none" strike="noStrike" cap="none">
         <a:solidFill>
           <a:srgbClr val="000000"/>
         </a:solidFill>
@@ -621,7 +637,7 @@
         <a:sym typeface="Arial"/>
       </a:defRPr>
     </a:lvl6pPr>
-    <a:lvl7pPr lvl="6" marR="0" rtl="0" algn="l">
+    <a:lvl7pPr marR="0" lvl="6" algn="l" rtl="0">
       <a:lnSpc>
         <a:spcPct val="100000"/>
       </a:lnSpc>
@@ -635,7 +651,7 @@
         <a:srgbClr val="000000"/>
       </a:buClr>
       <a:buFont typeface="Arial"/>
-      <a:defRPr b="0" i="0" sz="1400" u="none" cap="none" strike="noStrike">
+      <a:defRPr sz="1400" b="0" i="0" u="none" strike="noStrike" cap="none">
         <a:solidFill>
           <a:srgbClr val="000000"/>
         </a:solidFill>
@@ -645,7 +661,7 @@
         <a:sym typeface="Arial"/>
       </a:defRPr>
     </a:lvl7pPr>
-    <a:lvl8pPr lvl="7" marR="0" rtl="0" algn="l">
+    <a:lvl8pPr marR="0" lvl="7" algn="l" rtl="0">
       <a:lnSpc>
         <a:spcPct val="100000"/>
       </a:lnSpc>
@@ -659,7 +675,7 @@
         <a:srgbClr val="000000"/>
       </a:buClr>
       <a:buFont typeface="Arial"/>
-      <a:defRPr b="0" i="0" sz="1400" u="none" cap="none" strike="noStrike">
+      <a:defRPr sz="1400" b="0" i="0" u="none" strike="noStrike" cap="none">
         <a:solidFill>
           <a:srgbClr val="000000"/>
         </a:solidFill>
@@ -669,7 +685,7 @@
         <a:sym typeface="Arial"/>
       </a:defRPr>
     </a:lvl8pPr>
-    <a:lvl9pPr lvl="8" marR="0" rtl="0" algn="l">
+    <a:lvl9pPr marR="0" lvl="8" algn="l" rtl="0">
       <a:lnSpc>
         <a:spcPct val="100000"/>
       </a:lnSpc>
@@ -683,7 +699,7 @@
         <a:srgbClr val="000000"/>
       </a:buClr>
       <a:buFont typeface="Arial"/>
-      <a:defRPr b="0" i="0" sz="1400" u="none" cap="none" strike="noStrike">
+      <a:defRPr sz="1400" b="0" i="0" u="none" strike="noStrike" cap="none">
         <a:solidFill>
           <a:srgbClr val="000000"/>
         </a:solidFill>
@@ -698,11 +714,11 @@
 </file>
 
 <file path=ppt/notesSlides/notesSlide1.xml><?xml version="1.0" encoding="utf-8"?>
-<p:notes xmlns:a="http://schemas.openxmlformats.org/drawingml/2006/main" xmlns:r="http://schemas.openxmlformats.org/officeDocument/2006/relationships" xmlns:mc="http://schemas.openxmlformats.org/markup-compatibility/2006" xmlns:mv="urn:schemas-microsoft-com:mac:vml" xmlns:p="http://schemas.openxmlformats.org/presentationml/2006/main" xmlns:c="http://schemas.openxmlformats.org/drawingml/2006/chart" xmlns:dgm="http://schemas.openxmlformats.org/drawingml/2006/diagram" xmlns:o="urn:schemas-microsoft-com:office:office" xmlns:v="urn:schemas-microsoft-com:vml" xmlns:pvml="urn:schemas-microsoft-com:office:powerpoint" xmlns:com="http://schemas.openxmlformats.org/drawingml/2006/compatibility" xmlns:p14="http://schemas.microsoft.com/office/powerpoint/2010/main" xmlns:p15="http://schemas.microsoft.com/office/powerpoint/2012/main" xmlns:ahyp="http://schemas.microsoft.com/office/drawing/2018/hyperlinkcolor" showMasterPhAnim="0" showMasterSp="0">
+<p:notes xmlns:a="http://schemas.openxmlformats.org/drawingml/2006/main" xmlns:r="http://schemas.openxmlformats.org/officeDocument/2006/relationships" xmlns:p="http://schemas.openxmlformats.org/presentationml/2006/main" showMasterSp="0" showMasterPhAnim="0">
   <p:cSld>
     <p:spTree>
       <p:nvGrpSpPr>
-        <p:cNvPr id="50" name="Shape 50"/>
+        <p:cNvPr id="1" name="Shape 50"/>
         <p:cNvGrpSpPr/>
         <p:nvPr/>
       </p:nvGrpSpPr>
@@ -717,9 +733,11 @@
       <p:sp>
         <p:nvSpPr>
           <p:cNvPr id="51" name="Google Shape;51;p:notes"/>
-          <p:cNvSpPr/>
+          <p:cNvSpPr>
+            <a:spLocks noGrp="1" noRot="1" noChangeAspect="1"/>
+          </p:cNvSpPr>
           <p:nvPr>
-            <p:ph idx="2" type="sldImg"/>
+            <p:ph type="sldImg" idx="2"/>
           </p:nvPr>
         </p:nvSpPr>
         <p:spPr>
@@ -728,9 +746,13 @@
             <a:ext cx="6096075" cy="3429000"/>
           </a:xfrm>
           <a:custGeom>
-            <a:rect b="b" l="l" r="r" t="t"/>
+            <a:avLst/>
+            <a:gdLst/>
+            <a:ahLst/>
+            <a:cxnLst/>
+            <a:rect l="l" t="t" r="r" b="b"/>
             <a:pathLst>
-              <a:path extrusionOk="0" h="120000" w="120000">
+              <a:path w="120000" h="120000" extrusionOk="0">
                 <a:moveTo>
                   <a:pt x="0" y="0"/>
                 </a:moveTo>
@@ -752,9 +774,11 @@
       <p:sp>
         <p:nvSpPr>
           <p:cNvPr id="52" name="Google Shape;52;p:notes"/>
-          <p:cNvSpPr txBox="1"/>
+          <p:cNvSpPr txBox="1">
+            <a:spLocks noGrp="1"/>
+          </p:cNvSpPr>
           <p:nvPr>
-            <p:ph idx="1" type="body"/>
+            <p:ph type="body" idx="1"/>
           </p:nvPr>
         </p:nvSpPr>
         <p:spPr>
@@ -767,12 +791,12 @@
           </a:prstGeom>
         </p:spPr>
         <p:txBody>
-          <a:bodyPr anchorCtr="0" anchor="t" bIns="91425" lIns="91425" spcFirstLastPara="1" rIns="91425" wrap="square" tIns="91425">
+          <a:bodyPr spcFirstLastPara="1" wrap="square" lIns="91425" tIns="91425" rIns="91425" bIns="91425" anchor="t" anchorCtr="0">
             <a:noAutofit/>
           </a:bodyPr>
           <a:lstStyle/>
           <a:p>
-            <a:pPr indent="0" lvl="0" marL="0" rtl="0" algn="l">
+            <a:pPr marL="0" lvl="0" indent="0" algn="l" rtl="0">
               <a:spcBef>
                 <a:spcPts val="0"/>
               </a:spcBef>
@@ -781,9 +805,6 @@
               </a:spcAft>
               <a:buNone/>
             </a:pPr>
-            <a:r>
-              <a:t/>
-            </a:r>
             <a:endParaRPr/>
           </a:p>
         </p:txBody>
@@ -797,11 +818,11 @@
 </file>
 
 <file path=ppt/notesSlides/notesSlide2.xml><?xml version="1.0" encoding="utf-8"?>
-<p:notes xmlns:a="http://schemas.openxmlformats.org/drawingml/2006/main" xmlns:r="http://schemas.openxmlformats.org/officeDocument/2006/relationships" xmlns:mc="http://schemas.openxmlformats.org/markup-compatibility/2006" xmlns:mv="urn:schemas-microsoft-com:mac:vml" xmlns:p="http://schemas.openxmlformats.org/presentationml/2006/main" xmlns:c="http://schemas.openxmlformats.org/drawingml/2006/chart" xmlns:dgm="http://schemas.openxmlformats.org/drawingml/2006/diagram" xmlns:o="urn:schemas-microsoft-com:office:office" xmlns:v="urn:schemas-microsoft-com:vml" xmlns:pvml="urn:schemas-microsoft-com:office:powerpoint" xmlns:com="http://schemas.openxmlformats.org/drawingml/2006/compatibility" xmlns:p14="http://schemas.microsoft.com/office/powerpoint/2010/main" xmlns:p15="http://schemas.microsoft.com/office/powerpoint/2012/main" xmlns:ahyp="http://schemas.microsoft.com/office/drawing/2018/hyperlinkcolor" showMasterPhAnim="0" showMasterSp="0">
+<p:notes xmlns:a="http://schemas.openxmlformats.org/drawingml/2006/main" xmlns:r="http://schemas.openxmlformats.org/officeDocument/2006/relationships" xmlns:p="http://schemas.openxmlformats.org/presentationml/2006/main" showMasterSp="0" showMasterPhAnim="0">
   <p:cSld>
     <p:spTree>
       <p:nvGrpSpPr>
-        <p:cNvPr id="56" name="Shape 56"/>
+        <p:cNvPr id="1" name="Shape 56"/>
         <p:cNvGrpSpPr/>
         <p:nvPr/>
       </p:nvGrpSpPr>
@@ -816,9 +837,11 @@
       <p:sp>
         <p:nvSpPr>
           <p:cNvPr id="57" name="Google Shape;57;gccf42526c8_0_0:notes"/>
-          <p:cNvSpPr/>
+          <p:cNvSpPr>
+            <a:spLocks noGrp="1" noRot="1" noChangeAspect="1"/>
+          </p:cNvSpPr>
           <p:nvPr>
-            <p:ph idx="2" type="sldImg"/>
+            <p:ph type="sldImg" idx="2"/>
           </p:nvPr>
         </p:nvSpPr>
         <p:spPr>
@@ -827,9 +850,13 @@
             <a:ext cx="6096000" cy="3429000"/>
           </a:xfrm>
           <a:custGeom>
-            <a:rect b="b" l="l" r="r" t="t"/>
+            <a:avLst/>
+            <a:gdLst/>
+            <a:ahLst/>
+            <a:cxnLst/>
+            <a:rect l="l" t="t" r="r" b="b"/>
             <a:pathLst>
-              <a:path extrusionOk="0" h="120000" w="120000">
+              <a:path w="120000" h="120000" extrusionOk="0">
                 <a:moveTo>
                   <a:pt x="0" y="0"/>
                 </a:moveTo>
@@ -851,9 +878,11 @@
       <p:sp>
         <p:nvSpPr>
           <p:cNvPr id="58" name="Google Shape;58;gccf42526c8_0_0:notes"/>
-          <p:cNvSpPr txBox="1"/>
+          <p:cNvSpPr txBox="1">
+            <a:spLocks noGrp="1"/>
+          </p:cNvSpPr>
           <p:nvPr>
-            <p:ph idx="1" type="body"/>
+            <p:ph type="body" idx="1"/>
           </p:nvPr>
         </p:nvSpPr>
         <p:spPr>
@@ -866,12 +895,12 @@
           </a:prstGeom>
         </p:spPr>
         <p:txBody>
-          <a:bodyPr anchorCtr="0" anchor="t" bIns="91425" lIns="91425" spcFirstLastPara="1" rIns="91425" wrap="square" tIns="91425">
+          <a:bodyPr spcFirstLastPara="1" wrap="square" lIns="91425" tIns="91425" rIns="91425" bIns="91425" anchor="t" anchorCtr="0">
             <a:noAutofit/>
           </a:bodyPr>
           <a:lstStyle/>
           <a:p>
-            <a:pPr indent="0" lvl="0" marL="0" rtl="0" algn="l">
+            <a:pPr marL="0" lvl="0" indent="0" algn="l" rtl="0">
               <a:spcBef>
                 <a:spcPts val="0"/>
               </a:spcBef>
@@ -880,9 +909,6 @@
               </a:spcAft>
               <a:buNone/>
             </a:pPr>
-            <a:r>
-              <a:t/>
-            </a:r>
             <a:endParaRPr/>
           </a:p>
         </p:txBody>
@@ -896,11 +922,11 @@
 </file>
 
 <file path=ppt/notesSlides/notesSlide3.xml><?xml version="1.0" encoding="utf-8"?>
-<p:notes xmlns:a="http://schemas.openxmlformats.org/drawingml/2006/main" xmlns:r="http://schemas.openxmlformats.org/officeDocument/2006/relationships" xmlns:mc="http://schemas.openxmlformats.org/markup-compatibility/2006" xmlns:mv="urn:schemas-microsoft-com:mac:vml" xmlns:p="http://schemas.openxmlformats.org/presentationml/2006/main" xmlns:c="http://schemas.openxmlformats.org/drawingml/2006/chart" xmlns:dgm="http://schemas.openxmlformats.org/drawingml/2006/diagram" xmlns:o="urn:schemas-microsoft-com:office:office" xmlns:v="urn:schemas-microsoft-com:vml" xmlns:pvml="urn:schemas-microsoft-com:office:powerpoint" xmlns:com="http://schemas.openxmlformats.org/drawingml/2006/compatibility" xmlns:p14="http://schemas.microsoft.com/office/powerpoint/2010/main" xmlns:p15="http://schemas.microsoft.com/office/powerpoint/2012/main" xmlns:ahyp="http://schemas.microsoft.com/office/drawing/2018/hyperlinkcolor" showMasterPhAnim="0" showMasterSp="0">
+<p:notes xmlns:a="http://schemas.openxmlformats.org/drawingml/2006/main" xmlns:r="http://schemas.openxmlformats.org/officeDocument/2006/relationships" xmlns:p="http://schemas.openxmlformats.org/presentationml/2006/main" showMasterSp="0" showMasterPhAnim="0">
   <p:cSld>
     <p:spTree>
       <p:nvGrpSpPr>
-        <p:cNvPr id="62" name="Shape 62"/>
+        <p:cNvPr id="1" name="Shape 62"/>
         <p:cNvGrpSpPr/>
         <p:nvPr/>
       </p:nvGrpSpPr>
@@ -915,20 +941,26 @@
       <p:sp>
         <p:nvSpPr>
           <p:cNvPr id="63" name="Google Shape;63;gccf42526c8_0_6:notes"/>
-          <p:cNvSpPr/>
+          <p:cNvSpPr>
+            <a:spLocks noGrp="1" noRot="1" noChangeAspect="1"/>
+          </p:cNvSpPr>
           <p:nvPr>
-            <p:ph idx="2" type="sldImg"/>
+            <p:ph type="sldImg" idx="2"/>
           </p:nvPr>
         </p:nvSpPr>
         <p:spPr>
           <a:xfrm>
-            <a:off x="381300" y="685800"/>
+            <a:off x="381000" y="685800"/>
             <a:ext cx="6096000" cy="3429000"/>
           </a:xfrm>
           <a:custGeom>
-            <a:rect b="b" l="l" r="r" t="t"/>
+            <a:avLst/>
+            <a:gdLst/>
+            <a:ahLst/>
+            <a:cxnLst/>
+            <a:rect l="l" t="t" r="r" b="b"/>
             <a:pathLst>
-              <a:path extrusionOk="0" h="120000" w="120000">
+              <a:path w="120000" h="120000" extrusionOk="0">
                 <a:moveTo>
                   <a:pt x="0" y="0"/>
                 </a:moveTo>
@@ -950,9 +982,11 @@
       <p:sp>
         <p:nvSpPr>
           <p:cNvPr id="64" name="Google Shape;64;gccf42526c8_0_6:notes"/>
-          <p:cNvSpPr txBox="1"/>
+          <p:cNvSpPr txBox="1">
+            <a:spLocks noGrp="1"/>
+          </p:cNvSpPr>
           <p:nvPr>
-            <p:ph idx="1" type="body"/>
+            <p:ph type="body" idx="1"/>
           </p:nvPr>
         </p:nvSpPr>
         <p:spPr>
@@ -965,12 +999,12 @@
           </a:prstGeom>
         </p:spPr>
         <p:txBody>
-          <a:bodyPr anchorCtr="0" anchor="t" bIns="91425" lIns="91425" spcFirstLastPara="1" rIns="91425" wrap="square" tIns="91425">
+          <a:bodyPr spcFirstLastPara="1" wrap="square" lIns="91425" tIns="91425" rIns="91425" bIns="91425" anchor="t" anchorCtr="0">
             <a:noAutofit/>
           </a:bodyPr>
           <a:lstStyle/>
           <a:p>
-            <a:pPr indent="0" lvl="0" marL="0" rtl="0" algn="l">
+            <a:pPr marL="0" lvl="0" indent="0" algn="l" rtl="0">
               <a:spcBef>
                 <a:spcPts val="0"/>
               </a:spcBef>
@@ -979,9 +1013,6 @@
               </a:spcAft>
               <a:buNone/>
             </a:pPr>
-            <a:r>
-              <a:t/>
-            </a:r>
             <a:endParaRPr/>
           </a:p>
         </p:txBody>
@@ -995,11 +1026,11 @@
 </file>
 
 <file path=ppt/slideLayouts/slideLayout1.xml><?xml version="1.0" encoding="utf-8"?>
-<p:sldLayout xmlns:a="http://schemas.openxmlformats.org/drawingml/2006/main" xmlns:r="http://schemas.openxmlformats.org/officeDocument/2006/relationships" xmlns:mc="http://schemas.openxmlformats.org/markup-compatibility/2006" xmlns:mv="urn:schemas-microsoft-com:mac:vml" xmlns:p="http://schemas.openxmlformats.org/presentationml/2006/main" xmlns:c="http://schemas.openxmlformats.org/drawingml/2006/chart" xmlns:dgm="http://schemas.openxmlformats.org/drawingml/2006/diagram" xmlns:o="urn:schemas-microsoft-com:office:office" xmlns:v="urn:schemas-microsoft-com:vml" xmlns:pvml="urn:schemas-microsoft-com:office:powerpoint" xmlns:com="http://schemas.openxmlformats.org/drawingml/2006/compatibility" xmlns:p14="http://schemas.microsoft.com/office/powerpoint/2010/main" xmlns:p15="http://schemas.microsoft.com/office/powerpoint/2012/main" xmlns:ahyp="http://schemas.microsoft.com/office/drawing/2018/hyperlinkcolor" matchingName="Title slide" type="title">
+<p:sldLayout xmlns:a="http://schemas.openxmlformats.org/drawingml/2006/main" xmlns:r="http://schemas.openxmlformats.org/officeDocument/2006/relationships" xmlns:p="http://schemas.openxmlformats.org/presentationml/2006/main" matchingName="Title slide" type="title">
   <p:cSld name="TITLE">
     <p:spTree>
       <p:nvGrpSpPr>
-        <p:cNvPr id="9" name="Shape 9"/>
+        <p:cNvPr id="1" name="Shape 9"/>
         <p:cNvGrpSpPr/>
         <p:nvPr/>
       </p:nvGrpSpPr>
@@ -1014,7 +1045,9 @@
       <p:sp>
         <p:nvSpPr>
           <p:cNvPr id="10" name="Google Shape;10;p2"/>
-          <p:cNvSpPr txBox="1"/>
+          <p:cNvSpPr txBox="1">
+            <a:spLocks noGrp="1"/>
+          </p:cNvSpPr>
           <p:nvPr>
             <p:ph type="ctrTitle"/>
           </p:nvPr>
@@ -1029,7 +1062,7 @@
           </a:prstGeom>
         </p:spPr>
         <p:txBody>
-          <a:bodyPr anchorCtr="0" anchor="b" bIns="91425" lIns="91425" spcFirstLastPara="1" rIns="91425" wrap="square" tIns="91425">
+          <a:bodyPr spcFirstLastPara="1" wrap="square" lIns="91425" tIns="91425" rIns="91425" bIns="91425" anchor="b" anchorCtr="0">
             <a:normAutofit/>
           </a:bodyPr>
           <a:lstStyle>
@@ -1133,15 +1166,19 @@
               <a:defRPr sz="5200"/>
             </a:lvl9pPr>
           </a:lstStyle>
-          <a:p/>
+          <a:p>
+            <a:endParaRPr/>
+          </a:p>
         </p:txBody>
       </p:sp>
       <p:sp>
         <p:nvSpPr>
           <p:cNvPr id="11" name="Google Shape;11;p2"/>
-          <p:cNvSpPr txBox="1"/>
+          <p:cNvSpPr txBox="1">
+            <a:spLocks noGrp="1"/>
+          </p:cNvSpPr>
           <p:nvPr>
-            <p:ph idx="1" type="subTitle"/>
+            <p:ph type="subTitle" idx="1"/>
           </p:nvPr>
         </p:nvSpPr>
         <p:spPr>
@@ -1154,7 +1191,7 @@
           </a:prstGeom>
         </p:spPr>
         <p:txBody>
-          <a:bodyPr anchorCtr="0" anchor="t" bIns="91425" lIns="91425" spcFirstLastPara="1" rIns="91425" wrap="square" tIns="91425">
+          <a:bodyPr spcFirstLastPara="1" wrap="square" lIns="91425" tIns="91425" rIns="91425" bIns="91425" anchor="t" anchorCtr="0">
             <a:normAutofit/>
           </a:bodyPr>
           <a:lstStyle>
@@ -1285,15 +1322,19 @@
               <a:defRPr sz="2800"/>
             </a:lvl9pPr>
           </a:lstStyle>
-          <a:p/>
+          <a:p>
+            <a:endParaRPr/>
+          </a:p>
         </p:txBody>
       </p:sp>
       <p:sp>
         <p:nvSpPr>
           <p:cNvPr id="12" name="Google Shape;12;p2"/>
-          <p:cNvSpPr txBox="1"/>
+          <p:cNvSpPr txBox="1">
+            <a:spLocks noGrp="1"/>
+          </p:cNvSpPr>
           <p:nvPr>
-            <p:ph idx="12" type="sldNum"/>
+            <p:ph type="sldNum" idx="12"/>
           </p:nvPr>
         </p:nvSpPr>
         <p:spPr>
@@ -1306,7 +1347,7 @@
           </a:prstGeom>
         </p:spPr>
         <p:txBody>
-          <a:bodyPr anchorCtr="0" anchor="ctr" bIns="91425" lIns="91425" spcFirstLastPara="1" rIns="91425" wrap="square" tIns="91425">
+          <a:bodyPr spcFirstLastPara="1" wrap="square" lIns="91425" tIns="91425" rIns="91425" bIns="91425" anchor="ctr" anchorCtr="0">
             <a:normAutofit/>
           </a:bodyPr>
           <a:lstStyle>
@@ -1348,7 +1389,7 @@
             </a:lvl9pPr>
           </a:lstStyle>
           <a:p>
-            <a:pPr indent="0" lvl="0" marL="0" rtl="0" algn="r">
+            <a:pPr marL="0" lvl="0" indent="0" algn="r" rtl="0">
               <a:spcBef>
                 <a:spcPts val="0"/>
               </a:spcBef>
@@ -1374,11 +1415,11 @@
 </file>
 
 <file path=ppt/slideLayouts/slideLayout10.xml><?xml version="1.0" encoding="utf-8"?>
-<p:sldLayout xmlns:a="http://schemas.openxmlformats.org/drawingml/2006/main" xmlns:r="http://schemas.openxmlformats.org/officeDocument/2006/relationships" xmlns:mc="http://schemas.openxmlformats.org/markup-compatibility/2006" xmlns:mv="urn:schemas-microsoft-com:mac:vml" xmlns:p="http://schemas.openxmlformats.org/presentationml/2006/main" xmlns:c="http://schemas.openxmlformats.org/drawingml/2006/chart" xmlns:dgm="http://schemas.openxmlformats.org/drawingml/2006/diagram" xmlns:o="urn:schemas-microsoft-com:office:office" xmlns:v="urn:schemas-microsoft-com:vml" xmlns:pvml="urn:schemas-microsoft-com:office:powerpoint" xmlns:com="http://schemas.openxmlformats.org/drawingml/2006/compatibility" xmlns:p14="http://schemas.microsoft.com/office/powerpoint/2010/main" xmlns:p15="http://schemas.microsoft.com/office/powerpoint/2012/main" xmlns:ahyp="http://schemas.microsoft.com/office/drawing/2018/hyperlinkcolor" matchingName="Big number">
+<p:sldLayout xmlns:a="http://schemas.openxmlformats.org/drawingml/2006/main" xmlns:r="http://schemas.openxmlformats.org/officeDocument/2006/relationships" xmlns:p="http://schemas.openxmlformats.org/presentationml/2006/main" matchingName="Big number">
   <p:cSld name="BIG_NUMBER">
     <p:spTree>
       <p:nvGrpSpPr>
-        <p:cNvPr id="44" name="Shape 44"/>
+        <p:cNvPr id="1" name="Shape 44"/>
         <p:cNvGrpSpPr/>
         <p:nvPr/>
       </p:nvGrpSpPr>
@@ -1393,9 +1434,11 @@
       <p:sp>
         <p:nvSpPr>
           <p:cNvPr id="45" name="Google Shape;45;p11"/>
-          <p:cNvSpPr txBox="1"/>
+          <p:cNvSpPr txBox="1">
+            <a:spLocks noGrp="1"/>
+          </p:cNvSpPr>
           <p:nvPr>
-            <p:ph hasCustomPrompt="1" type="title"/>
+            <p:ph type="title" hasCustomPrompt="1"/>
           </p:nvPr>
         </p:nvSpPr>
         <p:spPr>
@@ -1408,7 +1451,7 @@
           </a:prstGeom>
         </p:spPr>
         <p:txBody>
-          <a:bodyPr anchorCtr="0" anchor="b" bIns="91425" lIns="91425" spcFirstLastPara="1" rIns="91425" wrap="square" tIns="91425">
+          <a:bodyPr spcFirstLastPara="1" wrap="square" lIns="91425" tIns="91425" rIns="91425" bIns="91425" anchor="b" anchorCtr="0">
             <a:normAutofit/>
           </a:bodyPr>
           <a:lstStyle>
@@ -1522,9 +1565,11 @@
       <p:sp>
         <p:nvSpPr>
           <p:cNvPr id="46" name="Google Shape;46;p11"/>
-          <p:cNvSpPr txBox="1"/>
+          <p:cNvSpPr txBox="1">
+            <a:spLocks noGrp="1"/>
+          </p:cNvSpPr>
           <p:nvPr>
-            <p:ph idx="1" type="body"/>
+            <p:ph type="body" idx="1"/>
           </p:nvPr>
         </p:nvSpPr>
         <p:spPr>
@@ -1537,11 +1582,11 @@
           </a:prstGeom>
         </p:spPr>
         <p:txBody>
-          <a:bodyPr anchorCtr="0" anchor="t" bIns="91425" lIns="91425" spcFirstLastPara="1" rIns="91425" wrap="square" tIns="91425">
+          <a:bodyPr spcFirstLastPara="1" wrap="square" lIns="91425" tIns="91425" rIns="91425" bIns="91425" anchor="t" anchorCtr="0">
             <a:normAutofit/>
           </a:bodyPr>
           <a:lstStyle>
-            <a:lvl1pPr indent="-342900" lvl="0" marL="457200" algn="ctr">
+            <a:lvl1pPr marL="457200" lvl="0" indent="-342900" algn="ctr">
               <a:spcBef>
                 <a:spcPts val="0"/>
               </a:spcBef>
@@ -1552,7 +1597,7 @@
               <a:buChar char="●"/>
               <a:defRPr/>
             </a:lvl1pPr>
-            <a:lvl2pPr indent="-317500" lvl="1" marL="914400" algn="ctr">
+            <a:lvl2pPr marL="914400" lvl="1" indent="-317500" algn="ctr">
               <a:spcBef>
                 <a:spcPts val="0"/>
               </a:spcBef>
@@ -1563,7 +1608,7 @@
               <a:buChar char="○"/>
               <a:defRPr/>
             </a:lvl2pPr>
-            <a:lvl3pPr indent="-317500" lvl="2" marL="1371600" algn="ctr">
+            <a:lvl3pPr marL="1371600" lvl="2" indent="-317500" algn="ctr">
               <a:spcBef>
                 <a:spcPts val="0"/>
               </a:spcBef>
@@ -1574,7 +1619,7 @@
               <a:buChar char="■"/>
               <a:defRPr/>
             </a:lvl3pPr>
-            <a:lvl4pPr indent="-317500" lvl="3" marL="1828800" algn="ctr">
+            <a:lvl4pPr marL="1828800" lvl="3" indent="-317500" algn="ctr">
               <a:spcBef>
                 <a:spcPts val="0"/>
               </a:spcBef>
@@ -1585,7 +1630,7 @@
               <a:buChar char="●"/>
               <a:defRPr/>
             </a:lvl4pPr>
-            <a:lvl5pPr indent="-317500" lvl="4" marL="2286000" algn="ctr">
+            <a:lvl5pPr marL="2286000" lvl="4" indent="-317500" algn="ctr">
               <a:spcBef>
                 <a:spcPts val="0"/>
               </a:spcBef>
@@ -1596,7 +1641,7 @@
               <a:buChar char="○"/>
               <a:defRPr/>
             </a:lvl5pPr>
-            <a:lvl6pPr indent="-317500" lvl="5" marL="2743200" algn="ctr">
+            <a:lvl6pPr marL="2743200" lvl="5" indent="-317500" algn="ctr">
               <a:spcBef>
                 <a:spcPts val="0"/>
               </a:spcBef>
@@ -1607,7 +1652,7 @@
               <a:buChar char="■"/>
               <a:defRPr/>
             </a:lvl6pPr>
-            <a:lvl7pPr indent="-317500" lvl="6" marL="3200400" algn="ctr">
+            <a:lvl7pPr marL="3200400" lvl="6" indent="-317500" algn="ctr">
               <a:spcBef>
                 <a:spcPts val="0"/>
               </a:spcBef>
@@ -1618,7 +1663,7 @@
               <a:buChar char="●"/>
               <a:defRPr/>
             </a:lvl7pPr>
-            <a:lvl8pPr indent="-317500" lvl="7" marL="3657600" algn="ctr">
+            <a:lvl8pPr marL="3657600" lvl="7" indent="-317500" algn="ctr">
               <a:spcBef>
                 <a:spcPts val="0"/>
               </a:spcBef>
@@ -1629,7 +1674,7 @@
               <a:buChar char="○"/>
               <a:defRPr/>
             </a:lvl8pPr>
-            <a:lvl9pPr indent="-317500" lvl="8" marL="4114800" algn="ctr">
+            <a:lvl9pPr marL="4114800" lvl="8" indent="-317500" algn="ctr">
               <a:spcBef>
                 <a:spcPts val="0"/>
               </a:spcBef>
@@ -1641,15 +1686,19 @@
               <a:defRPr/>
             </a:lvl9pPr>
           </a:lstStyle>
-          <a:p/>
+          <a:p>
+            <a:endParaRPr/>
+          </a:p>
         </p:txBody>
       </p:sp>
       <p:sp>
         <p:nvSpPr>
           <p:cNvPr id="47" name="Google Shape;47;p11"/>
-          <p:cNvSpPr txBox="1"/>
+          <p:cNvSpPr txBox="1">
+            <a:spLocks noGrp="1"/>
+          </p:cNvSpPr>
           <p:nvPr>
-            <p:ph idx="12" type="sldNum"/>
+            <p:ph type="sldNum" idx="12"/>
           </p:nvPr>
         </p:nvSpPr>
         <p:spPr>
@@ -1662,7 +1711,7 @@
           </a:prstGeom>
         </p:spPr>
         <p:txBody>
-          <a:bodyPr anchorCtr="0" anchor="ctr" bIns="91425" lIns="91425" spcFirstLastPara="1" rIns="91425" wrap="square" tIns="91425">
+          <a:bodyPr spcFirstLastPara="1" wrap="square" lIns="91425" tIns="91425" rIns="91425" bIns="91425" anchor="ctr" anchorCtr="0">
             <a:normAutofit/>
           </a:bodyPr>
           <a:lstStyle>
@@ -1704,7 +1753,7 @@
             </a:lvl9pPr>
           </a:lstStyle>
           <a:p>
-            <a:pPr indent="0" lvl="0" marL="0" rtl="0" algn="r">
+            <a:pPr marL="0" lvl="0" indent="0" algn="r" rtl="0">
               <a:spcBef>
                 <a:spcPts val="0"/>
               </a:spcBef>
@@ -1730,11 +1779,11 @@
 </file>
 
 <file path=ppt/slideLayouts/slideLayout11.xml><?xml version="1.0" encoding="utf-8"?>
-<p:sldLayout xmlns:a="http://schemas.openxmlformats.org/drawingml/2006/main" xmlns:r="http://schemas.openxmlformats.org/officeDocument/2006/relationships" xmlns:mc="http://schemas.openxmlformats.org/markup-compatibility/2006" xmlns:mv="urn:schemas-microsoft-com:mac:vml" xmlns:p="http://schemas.openxmlformats.org/presentationml/2006/main" xmlns:c="http://schemas.openxmlformats.org/drawingml/2006/chart" xmlns:dgm="http://schemas.openxmlformats.org/drawingml/2006/diagram" xmlns:o="urn:schemas-microsoft-com:office:office" xmlns:v="urn:schemas-microsoft-com:vml" xmlns:pvml="urn:schemas-microsoft-com:office:powerpoint" xmlns:com="http://schemas.openxmlformats.org/drawingml/2006/compatibility" xmlns:p14="http://schemas.microsoft.com/office/powerpoint/2010/main" xmlns:p15="http://schemas.microsoft.com/office/powerpoint/2012/main" xmlns:ahyp="http://schemas.microsoft.com/office/drawing/2018/hyperlinkcolor" matchingName="Blank" type="blank">
+<p:sldLayout xmlns:a="http://schemas.openxmlformats.org/drawingml/2006/main" xmlns:r="http://schemas.openxmlformats.org/officeDocument/2006/relationships" xmlns:p="http://schemas.openxmlformats.org/presentationml/2006/main" matchingName="Blank" type="blank">
   <p:cSld name="BLANK">
     <p:spTree>
       <p:nvGrpSpPr>
-        <p:cNvPr id="48" name="Shape 48"/>
+        <p:cNvPr id="1" name="Shape 48"/>
         <p:cNvGrpSpPr/>
         <p:nvPr/>
       </p:nvGrpSpPr>
@@ -1749,9 +1798,11 @@
       <p:sp>
         <p:nvSpPr>
           <p:cNvPr id="49" name="Google Shape;49;p12"/>
-          <p:cNvSpPr txBox="1"/>
+          <p:cNvSpPr txBox="1">
+            <a:spLocks noGrp="1"/>
+          </p:cNvSpPr>
           <p:nvPr>
-            <p:ph idx="12" type="sldNum"/>
+            <p:ph type="sldNum" idx="12"/>
           </p:nvPr>
         </p:nvSpPr>
         <p:spPr>
@@ -1764,7 +1815,7 @@
           </a:prstGeom>
         </p:spPr>
         <p:txBody>
-          <a:bodyPr anchorCtr="0" anchor="ctr" bIns="91425" lIns="91425" spcFirstLastPara="1" rIns="91425" wrap="square" tIns="91425">
+          <a:bodyPr spcFirstLastPara="1" wrap="square" lIns="91425" tIns="91425" rIns="91425" bIns="91425" anchor="ctr" anchorCtr="0">
             <a:normAutofit/>
           </a:bodyPr>
           <a:lstStyle>
@@ -1806,7 +1857,7 @@
             </a:lvl9pPr>
           </a:lstStyle>
           <a:p>
-            <a:pPr indent="0" lvl="0" marL="0" rtl="0" algn="r">
+            <a:pPr marL="0" lvl="0" indent="0" algn="r" rtl="0">
               <a:spcBef>
                 <a:spcPts val="0"/>
               </a:spcBef>
@@ -1832,11 +1883,11 @@
 </file>
 
 <file path=ppt/slideLayouts/slideLayout2.xml><?xml version="1.0" encoding="utf-8"?>
-<p:sldLayout xmlns:a="http://schemas.openxmlformats.org/drawingml/2006/main" xmlns:r="http://schemas.openxmlformats.org/officeDocument/2006/relationships" xmlns:mc="http://schemas.openxmlformats.org/markup-compatibility/2006" xmlns:mv="urn:schemas-microsoft-com:mac:vml" xmlns:p="http://schemas.openxmlformats.org/presentationml/2006/main" xmlns:c="http://schemas.openxmlformats.org/drawingml/2006/chart" xmlns:dgm="http://schemas.openxmlformats.org/drawingml/2006/diagram" xmlns:o="urn:schemas-microsoft-com:office:office" xmlns:v="urn:schemas-microsoft-com:vml" xmlns:pvml="urn:schemas-microsoft-com:office:powerpoint" xmlns:com="http://schemas.openxmlformats.org/drawingml/2006/compatibility" xmlns:p14="http://schemas.microsoft.com/office/powerpoint/2010/main" xmlns:p15="http://schemas.microsoft.com/office/powerpoint/2012/main" xmlns:ahyp="http://schemas.microsoft.com/office/drawing/2018/hyperlinkcolor" matchingName="Section header" type="secHead">
+<p:sldLayout xmlns:a="http://schemas.openxmlformats.org/drawingml/2006/main" xmlns:r="http://schemas.openxmlformats.org/officeDocument/2006/relationships" xmlns:p="http://schemas.openxmlformats.org/presentationml/2006/main" matchingName="Section header" type="secHead">
   <p:cSld name="SECTION_HEADER">
     <p:spTree>
       <p:nvGrpSpPr>
-        <p:cNvPr id="13" name="Shape 13"/>
+        <p:cNvPr id="1" name="Shape 13"/>
         <p:cNvGrpSpPr/>
         <p:nvPr/>
       </p:nvGrpSpPr>
@@ -1851,7 +1902,9 @@
       <p:sp>
         <p:nvSpPr>
           <p:cNvPr id="14" name="Google Shape;14;p3"/>
-          <p:cNvSpPr txBox="1"/>
+          <p:cNvSpPr txBox="1">
+            <a:spLocks noGrp="1"/>
+          </p:cNvSpPr>
           <p:nvPr>
             <p:ph type="title"/>
           </p:nvPr>
@@ -1866,7 +1919,7 @@
           </a:prstGeom>
         </p:spPr>
         <p:txBody>
-          <a:bodyPr anchorCtr="0" anchor="ctr" bIns="91425" lIns="91425" spcFirstLastPara="1" rIns="91425" wrap="square" tIns="91425">
+          <a:bodyPr spcFirstLastPara="1" wrap="square" lIns="91425" tIns="91425" rIns="91425" bIns="91425" anchor="ctr" anchorCtr="0">
             <a:normAutofit/>
           </a:bodyPr>
           <a:lstStyle>
@@ -1970,15 +2023,19 @@
               <a:defRPr sz="3600"/>
             </a:lvl9pPr>
           </a:lstStyle>
-          <a:p/>
+          <a:p>
+            <a:endParaRPr/>
+          </a:p>
         </p:txBody>
       </p:sp>
       <p:sp>
         <p:nvSpPr>
           <p:cNvPr id="15" name="Google Shape;15;p3"/>
-          <p:cNvSpPr txBox="1"/>
+          <p:cNvSpPr txBox="1">
+            <a:spLocks noGrp="1"/>
+          </p:cNvSpPr>
           <p:nvPr>
-            <p:ph idx="12" type="sldNum"/>
+            <p:ph type="sldNum" idx="12"/>
           </p:nvPr>
         </p:nvSpPr>
         <p:spPr>
@@ -1991,7 +2048,7 @@
           </a:prstGeom>
         </p:spPr>
         <p:txBody>
-          <a:bodyPr anchorCtr="0" anchor="ctr" bIns="91425" lIns="91425" spcFirstLastPara="1" rIns="91425" wrap="square" tIns="91425">
+          <a:bodyPr spcFirstLastPara="1" wrap="square" lIns="91425" tIns="91425" rIns="91425" bIns="91425" anchor="ctr" anchorCtr="0">
             <a:normAutofit/>
           </a:bodyPr>
           <a:lstStyle>
@@ -2033,7 +2090,7 @@
             </a:lvl9pPr>
           </a:lstStyle>
           <a:p>
-            <a:pPr indent="0" lvl="0" marL="0" rtl="0" algn="r">
+            <a:pPr marL="0" lvl="0" indent="0" algn="r" rtl="0">
               <a:spcBef>
                 <a:spcPts val="0"/>
               </a:spcBef>
@@ -2059,11 +2116,11 @@
 </file>
 
 <file path=ppt/slideLayouts/slideLayout3.xml><?xml version="1.0" encoding="utf-8"?>
-<p:sldLayout xmlns:a="http://schemas.openxmlformats.org/drawingml/2006/main" xmlns:r="http://schemas.openxmlformats.org/officeDocument/2006/relationships" xmlns:mc="http://schemas.openxmlformats.org/markup-compatibility/2006" xmlns:mv="urn:schemas-microsoft-com:mac:vml" xmlns:p="http://schemas.openxmlformats.org/presentationml/2006/main" xmlns:c="http://schemas.openxmlformats.org/drawingml/2006/chart" xmlns:dgm="http://schemas.openxmlformats.org/drawingml/2006/diagram" xmlns:o="urn:schemas-microsoft-com:office:office" xmlns:v="urn:schemas-microsoft-com:vml" xmlns:pvml="urn:schemas-microsoft-com:office:powerpoint" xmlns:com="http://schemas.openxmlformats.org/drawingml/2006/compatibility" xmlns:p14="http://schemas.microsoft.com/office/powerpoint/2010/main" xmlns:p15="http://schemas.microsoft.com/office/powerpoint/2012/main" xmlns:ahyp="http://schemas.microsoft.com/office/drawing/2018/hyperlinkcolor" matchingName="Title and body" type="tx">
+<p:sldLayout xmlns:a="http://schemas.openxmlformats.org/drawingml/2006/main" xmlns:r="http://schemas.openxmlformats.org/officeDocument/2006/relationships" xmlns:p="http://schemas.openxmlformats.org/presentationml/2006/main" matchingName="Title and body" type="tx">
   <p:cSld name="TITLE_AND_BODY">
     <p:spTree>
       <p:nvGrpSpPr>
-        <p:cNvPr id="16" name="Shape 16"/>
+        <p:cNvPr id="1" name="Shape 16"/>
         <p:cNvGrpSpPr/>
         <p:nvPr/>
       </p:nvGrpSpPr>
@@ -2078,7 +2135,9 @@
       <p:sp>
         <p:nvSpPr>
           <p:cNvPr id="17" name="Google Shape;17;p4"/>
-          <p:cNvSpPr txBox="1"/>
+          <p:cNvSpPr txBox="1">
+            <a:spLocks noGrp="1"/>
+          </p:cNvSpPr>
           <p:nvPr>
             <p:ph type="title"/>
           </p:nvPr>
@@ -2093,7 +2152,7 @@
           </a:prstGeom>
         </p:spPr>
         <p:txBody>
-          <a:bodyPr anchorCtr="0" anchor="t" bIns="91425" lIns="91425" spcFirstLastPara="1" rIns="91425" wrap="square" tIns="91425">
+          <a:bodyPr spcFirstLastPara="1" wrap="square" lIns="91425" tIns="91425" rIns="91425" bIns="91425" anchor="t" anchorCtr="0">
             <a:normAutofit/>
           </a:bodyPr>
           <a:lstStyle>
@@ -2197,15 +2256,19 @@
               <a:defRPr/>
             </a:lvl9pPr>
           </a:lstStyle>
-          <a:p/>
+          <a:p>
+            <a:endParaRPr/>
+          </a:p>
         </p:txBody>
       </p:sp>
       <p:sp>
         <p:nvSpPr>
           <p:cNvPr id="18" name="Google Shape;18;p4"/>
-          <p:cNvSpPr txBox="1"/>
+          <p:cNvSpPr txBox="1">
+            <a:spLocks noGrp="1"/>
+          </p:cNvSpPr>
           <p:nvPr>
-            <p:ph idx="1" type="body"/>
+            <p:ph type="body" idx="1"/>
           </p:nvPr>
         </p:nvSpPr>
         <p:spPr>
@@ -2218,11 +2281,11 @@
           </a:prstGeom>
         </p:spPr>
         <p:txBody>
-          <a:bodyPr anchorCtr="0" anchor="t" bIns="91425" lIns="91425" spcFirstLastPara="1" rIns="91425" wrap="square" tIns="91425">
+          <a:bodyPr spcFirstLastPara="1" wrap="square" lIns="91425" tIns="91425" rIns="91425" bIns="91425" anchor="t" anchorCtr="0">
             <a:normAutofit/>
           </a:bodyPr>
           <a:lstStyle>
-            <a:lvl1pPr indent="-342900" lvl="0" marL="457200">
+            <a:lvl1pPr marL="457200" lvl="0" indent="-342900">
               <a:spcBef>
                 <a:spcPts val="0"/>
               </a:spcBef>
@@ -2233,7 +2296,7 @@
               <a:buChar char="●"/>
               <a:defRPr/>
             </a:lvl1pPr>
-            <a:lvl2pPr indent="-317500" lvl="1" marL="914400">
+            <a:lvl2pPr marL="914400" lvl="1" indent="-317500">
               <a:spcBef>
                 <a:spcPts val="0"/>
               </a:spcBef>
@@ -2244,7 +2307,7 @@
               <a:buChar char="○"/>
               <a:defRPr/>
             </a:lvl2pPr>
-            <a:lvl3pPr indent="-317500" lvl="2" marL="1371600">
+            <a:lvl3pPr marL="1371600" lvl="2" indent="-317500">
               <a:spcBef>
                 <a:spcPts val="0"/>
               </a:spcBef>
@@ -2255,7 +2318,7 @@
               <a:buChar char="■"/>
               <a:defRPr/>
             </a:lvl3pPr>
-            <a:lvl4pPr indent="-317500" lvl="3" marL="1828800">
+            <a:lvl4pPr marL="1828800" lvl="3" indent="-317500">
               <a:spcBef>
                 <a:spcPts val="0"/>
               </a:spcBef>
@@ -2266,7 +2329,7 @@
               <a:buChar char="●"/>
               <a:defRPr/>
             </a:lvl4pPr>
-            <a:lvl5pPr indent="-317500" lvl="4" marL="2286000">
+            <a:lvl5pPr marL="2286000" lvl="4" indent="-317500">
               <a:spcBef>
                 <a:spcPts val="0"/>
               </a:spcBef>
@@ -2277,7 +2340,7 @@
               <a:buChar char="○"/>
               <a:defRPr/>
             </a:lvl5pPr>
-            <a:lvl6pPr indent="-317500" lvl="5" marL="2743200">
+            <a:lvl6pPr marL="2743200" lvl="5" indent="-317500">
               <a:spcBef>
                 <a:spcPts val="0"/>
               </a:spcBef>
@@ -2288,7 +2351,7 @@
               <a:buChar char="■"/>
               <a:defRPr/>
             </a:lvl6pPr>
-            <a:lvl7pPr indent="-317500" lvl="6" marL="3200400">
+            <a:lvl7pPr marL="3200400" lvl="6" indent="-317500">
               <a:spcBef>
                 <a:spcPts val="0"/>
               </a:spcBef>
@@ -2299,7 +2362,7 @@
               <a:buChar char="●"/>
               <a:defRPr/>
             </a:lvl7pPr>
-            <a:lvl8pPr indent="-317500" lvl="7" marL="3657600">
+            <a:lvl8pPr marL="3657600" lvl="7" indent="-317500">
               <a:spcBef>
                 <a:spcPts val="0"/>
               </a:spcBef>
@@ -2310,7 +2373,7 @@
               <a:buChar char="○"/>
               <a:defRPr/>
             </a:lvl8pPr>
-            <a:lvl9pPr indent="-317500" lvl="8" marL="4114800">
+            <a:lvl9pPr marL="4114800" lvl="8" indent="-317500">
               <a:spcBef>
                 <a:spcPts val="0"/>
               </a:spcBef>
@@ -2322,15 +2385,19 @@
               <a:defRPr/>
             </a:lvl9pPr>
           </a:lstStyle>
-          <a:p/>
+          <a:p>
+            <a:endParaRPr/>
+          </a:p>
         </p:txBody>
       </p:sp>
       <p:sp>
         <p:nvSpPr>
           <p:cNvPr id="19" name="Google Shape;19;p4"/>
-          <p:cNvSpPr txBox="1"/>
+          <p:cNvSpPr txBox="1">
+            <a:spLocks noGrp="1"/>
+          </p:cNvSpPr>
           <p:nvPr>
-            <p:ph idx="12" type="sldNum"/>
+            <p:ph type="sldNum" idx="12"/>
           </p:nvPr>
         </p:nvSpPr>
         <p:spPr>
@@ -2343,7 +2410,7 @@
           </a:prstGeom>
         </p:spPr>
         <p:txBody>
-          <a:bodyPr anchorCtr="0" anchor="ctr" bIns="91425" lIns="91425" spcFirstLastPara="1" rIns="91425" wrap="square" tIns="91425">
+          <a:bodyPr spcFirstLastPara="1" wrap="square" lIns="91425" tIns="91425" rIns="91425" bIns="91425" anchor="ctr" anchorCtr="0">
             <a:normAutofit/>
           </a:bodyPr>
           <a:lstStyle>
@@ -2385,7 +2452,7 @@
             </a:lvl9pPr>
           </a:lstStyle>
           <a:p>
-            <a:pPr indent="0" lvl="0" marL="0" rtl="0" algn="r">
+            <a:pPr marL="0" lvl="0" indent="0" algn="r" rtl="0">
               <a:spcBef>
                 <a:spcPts val="0"/>
               </a:spcBef>
@@ -2411,11 +2478,11 @@
 </file>
 
 <file path=ppt/slideLayouts/slideLayout4.xml><?xml version="1.0" encoding="utf-8"?>
-<p:sldLayout xmlns:a="http://schemas.openxmlformats.org/drawingml/2006/main" xmlns:r="http://schemas.openxmlformats.org/officeDocument/2006/relationships" xmlns:mc="http://schemas.openxmlformats.org/markup-compatibility/2006" xmlns:mv="urn:schemas-microsoft-com:mac:vml" xmlns:p="http://schemas.openxmlformats.org/presentationml/2006/main" xmlns:c="http://schemas.openxmlformats.org/drawingml/2006/chart" xmlns:dgm="http://schemas.openxmlformats.org/drawingml/2006/diagram" xmlns:o="urn:schemas-microsoft-com:office:office" xmlns:v="urn:schemas-microsoft-com:vml" xmlns:pvml="urn:schemas-microsoft-com:office:powerpoint" xmlns:com="http://schemas.openxmlformats.org/drawingml/2006/compatibility" xmlns:p14="http://schemas.microsoft.com/office/powerpoint/2010/main" xmlns:p15="http://schemas.microsoft.com/office/powerpoint/2012/main" xmlns:ahyp="http://schemas.microsoft.com/office/drawing/2018/hyperlinkcolor" matchingName="Title and two columns" type="twoColTx">
+<p:sldLayout xmlns:a="http://schemas.openxmlformats.org/drawingml/2006/main" xmlns:r="http://schemas.openxmlformats.org/officeDocument/2006/relationships" xmlns:p="http://schemas.openxmlformats.org/presentationml/2006/main" matchingName="Title and two columns" type="twoColTx">
   <p:cSld name="TITLE_AND_TWO_COLUMNS">
     <p:spTree>
       <p:nvGrpSpPr>
-        <p:cNvPr id="20" name="Shape 20"/>
+        <p:cNvPr id="1" name="Shape 20"/>
         <p:cNvGrpSpPr/>
         <p:nvPr/>
       </p:nvGrpSpPr>
@@ -2430,7 +2497,9 @@
       <p:sp>
         <p:nvSpPr>
           <p:cNvPr id="21" name="Google Shape;21;p5"/>
-          <p:cNvSpPr txBox="1"/>
+          <p:cNvSpPr txBox="1">
+            <a:spLocks noGrp="1"/>
+          </p:cNvSpPr>
           <p:nvPr>
             <p:ph type="title"/>
           </p:nvPr>
@@ -2445,7 +2514,7 @@
           </a:prstGeom>
         </p:spPr>
         <p:txBody>
-          <a:bodyPr anchorCtr="0" anchor="t" bIns="91425" lIns="91425" spcFirstLastPara="1" rIns="91425" wrap="square" tIns="91425">
+          <a:bodyPr spcFirstLastPara="1" wrap="square" lIns="91425" tIns="91425" rIns="91425" bIns="91425" anchor="t" anchorCtr="0">
             <a:normAutofit/>
           </a:bodyPr>
           <a:lstStyle>
@@ -2549,15 +2618,19 @@
               <a:defRPr/>
             </a:lvl9pPr>
           </a:lstStyle>
-          <a:p/>
+          <a:p>
+            <a:endParaRPr/>
+          </a:p>
         </p:txBody>
       </p:sp>
       <p:sp>
         <p:nvSpPr>
           <p:cNvPr id="22" name="Google Shape;22;p5"/>
-          <p:cNvSpPr txBox="1"/>
+          <p:cNvSpPr txBox="1">
+            <a:spLocks noGrp="1"/>
+          </p:cNvSpPr>
           <p:nvPr>
-            <p:ph idx="1" type="body"/>
+            <p:ph type="body" idx="1"/>
           </p:nvPr>
         </p:nvSpPr>
         <p:spPr>
@@ -2570,11 +2643,11 @@
           </a:prstGeom>
         </p:spPr>
         <p:txBody>
-          <a:bodyPr anchorCtr="0" anchor="t" bIns="91425" lIns="91425" spcFirstLastPara="1" rIns="91425" wrap="square" tIns="91425">
+          <a:bodyPr spcFirstLastPara="1" wrap="square" lIns="91425" tIns="91425" rIns="91425" bIns="91425" anchor="t" anchorCtr="0">
             <a:normAutofit/>
           </a:bodyPr>
           <a:lstStyle>
-            <a:lvl1pPr indent="-317500" lvl="0" marL="457200">
+            <a:lvl1pPr marL="457200" lvl="0" indent="-317500">
               <a:spcBef>
                 <a:spcPts val="0"/>
               </a:spcBef>
@@ -2585,7 +2658,7 @@
               <a:buChar char="●"/>
               <a:defRPr sz="1400"/>
             </a:lvl1pPr>
-            <a:lvl2pPr indent="-304800" lvl="1" marL="914400">
+            <a:lvl2pPr marL="914400" lvl="1" indent="-304800">
               <a:spcBef>
                 <a:spcPts val="0"/>
               </a:spcBef>
@@ -2596,7 +2669,7 @@
               <a:buChar char="○"/>
               <a:defRPr sz="1200"/>
             </a:lvl2pPr>
-            <a:lvl3pPr indent="-304800" lvl="2" marL="1371600">
+            <a:lvl3pPr marL="1371600" lvl="2" indent="-304800">
               <a:spcBef>
                 <a:spcPts val="0"/>
               </a:spcBef>
@@ -2607,7 +2680,7 @@
               <a:buChar char="■"/>
               <a:defRPr sz="1200"/>
             </a:lvl3pPr>
-            <a:lvl4pPr indent="-304800" lvl="3" marL="1828800">
+            <a:lvl4pPr marL="1828800" lvl="3" indent="-304800">
               <a:spcBef>
                 <a:spcPts val="0"/>
               </a:spcBef>
@@ -2618,7 +2691,7 @@
               <a:buChar char="●"/>
               <a:defRPr sz="1200"/>
             </a:lvl4pPr>
-            <a:lvl5pPr indent="-304800" lvl="4" marL="2286000">
+            <a:lvl5pPr marL="2286000" lvl="4" indent="-304800">
               <a:spcBef>
                 <a:spcPts val="0"/>
               </a:spcBef>
@@ -2629,7 +2702,7 @@
               <a:buChar char="○"/>
               <a:defRPr sz="1200"/>
             </a:lvl5pPr>
-            <a:lvl6pPr indent="-304800" lvl="5" marL="2743200">
+            <a:lvl6pPr marL="2743200" lvl="5" indent="-304800">
               <a:spcBef>
                 <a:spcPts val="0"/>
               </a:spcBef>
@@ -2640,7 +2713,7 @@
               <a:buChar char="■"/>
               <a:defRPr sz="1200"/>
             </a:lvl6pPr>
-            <a:lvl7pPr indent="-304800" lvl="6" marL="3200400">
+            <a:lvl7pPr marL="3200400" lvl="6" indent="-304800">
               <a:spcBef>
                 <a:spcPts val="0"/>
               </a:spcBef>
@@ -2651,7 +2724,7 @@
               <a:buChar char="●"/>
               <a:defRPr sz="1200"/>
             </a:lvl7pPr>
-            <a:lvl8pPr indent="-304800" lvl="7" marL="3657600">
+            <a:lvl8pPr marL="3657600" lvl="7" indent="-304800">
               <a:spcBef>
                 <a:spcPts val="0"/>
               </a:spcBef>
@@ -2662,7 +2735,7 @@
               <a:buChar char="○"/>
               <a:defRPr sz="1200"/>
             </a:lvl8pPr>
-            <a:lvl9pPr indent="-304800" lvl="8" marL="4114800">
+            <a:lvl9pPr marL="4114800" lvl="8" indent="-304800">
               <a:spcBef>
                 <a:spcPts val="0"/>
               </a:spcBef>
@@ -2674,15 +2747,19 @@
               <a:defRPr sz="1200"/>
             </a:lvl9pPr>
           </a:lstStyle>
-          <a:p/>
+          <a:p>
+            <a:endParaRPr/>
+          </a:p>
         </p:txBody>
       </p:sp>
       <p:sp>
         <p:nvSpPr>
           <p:cNvPr id="23" name="Google Shape;23;p5"/>
-          <p:cNvSpPr txBox="1"/>
+          <p:cNvSpPr txBox="1">
+            <a:spLocks noGrp="1"/>
+          </p:cNvSpPr>
           <p:nvPr>
-            <p:ph idx="2" type="body"/>
+            <p:ph type="body" idx="2"/>
           </p:nvPr>
         </p:nvSpPr>
         <p:spPr>
@@ -2695,11 +2772,11 @@
           </a:prstGeom>
         </p:spPr>
         <p:txBody>
-          <a:bodyPr anchorCtr="0" anchor="t" bIns="91425" lIns="91425" spcFirstLastPara="1" rIns="91425" wrap="square" tIns="91425">
+          <a:bodyPr spcFirstLastPara="1" wrap="square" lIns="91425" tIns="91425" rIns="91425" bIns="91425" anchor="t" anchorCtr="0">
             <a:normAutofit/>
           </a:bodyPr>
           <a:lstStyle>
-            <a:lvl1pPr indent="-317500" lvl="0" marL="457200">
+            <a:lvl1pPr marL="457200" lvl="0" indent="-317500">
               <a:spcBef>
                 <a:spcPts val="0"/>
               </a:spcBef>
@@ -2710,7 +2787,7 @@
               <a:buChar char="●"/>
               <a:defRPr sz="1400"/>
             </a:lvl1pPr>
-            <a:lvl2pPr indent="-304800" lvl="1" marL="914400">
+            <a:lvl2pPr marL="914400" lvl="1" indent="-304800">
               <a:spcBef>
                 <a:spcPts val="0"/>
               </a:spcBef>
@@ -2721,7 +2798,7 @@
               <a:buChar char="○"/>
               <a:defRPr sz="1200"/>
             </a:lvl2pPr>
-            <a:lvl3pPr indent="-304800" lvl="2" marL="1371600">
+            <a:lvl3pPr marL="1371600" lvl="2" indent="-304800">
               <a:spcBef>
                 <a:spcPts val="0"/>
               </a:spcBef>
@@ -2732,7 +2809,7 @@
               <a:buChar char="■"/>
               <a:defRPr sz="1200"/>
             </a:lvl3pPr>
-            <a:lvl4pPr indent="-304800" lvl="3" marL="1828800">
+            <a:lvl4pPr marL="1828800" lvl="3" indent="-304800">
               <a:spcBef>
                 <a:spcPts val="0"/>
               </a:spcBef>
@@ -2743,7 +2820,7 @@
               <a:buChar char="●"/>
               <a:defRPr sz="1200"/>
             </a:lvl4pPr>
-            <a:lvl5pPr indent="-304800" lvl="4" marL="2286000">
+            <a:lvl5pPr marL="2286000" lvl="4" indent="-304800">
               <a:spcBef>
                 <a:spcPts val="0"/>
               </a:spcBef>
@@ -2754,7 +2831,7 @@
               <a:buChar char="○"/>
               <a:defRPr sz="1200"/>
             </a:lvl5pPr>
-            <a:lvl6pPr indent="-304800" lvl="5" marL="2743200">
+            <a:lvl6pPr marL="2743200" lvl="5" indent="-304800">
               <a:spcBef>
                 <a:spcPts val="0"/>
               </a:spcBef>
@@ -2765,7 +2842,7 @@
               <a:buChar char="■"/>
               <a:defRPr sz="1200"/>
             </a:lvl6pPr>
-            <a:lvl7pPr indent="-304800" lvl="6" marL="3200400">
+            <a:lvl7pPr marL="3200400" lvl="6" indent="-304800">
               <a:spcBef>
                 <a:spcPts val="0"/>
               </a:spcBef>
@@ -2776,7 +2853,7 @@
               <a:buChar char="●"/>
               <a:defRPr sz="1200"/>
             </a:lvl7pPr>
-            <a:lvl8pPr indent="-304800" lvl="7" marL="3657600">
+            <a:lvl8pPr marL="3657600" lvl="7" indent="-304800">
               <a:spcBef>
                 <a:spcPts val="0"/>
               </a:spcBef>
@@ -2787,7 +2864,7 @@
               <a:buChar char="○"/>
               <a:defRPr sz="1200"/>
             </a:lvl8pPr>
-            <a:lvl9pPr indent="-304800" lvl="8" marL="4114800">
+            <a:lvl9pPr marL="4114800" lvl="8" indent="-304800">
               <a:spcBef>
                 <a:spcPts val="0"/>
               </a:spcBef>
@@ -2799,15 +2876,19 @@
               <a:defRPr sz="1200"/>
             </a:lvl9pPr>
           </a:lstStyle>
-          <a:p/>
+          <a:p>
+            <a:endParaRPr/>
+          </a:p>
         </p:txBody>
       </p:sp>
       <p:sp>
         <p:nvSpPr>
           <p:cNvPr id="24" name="Google Shape;24;p5"/>
-          <p:cNvSpPr txBox="1"/>
+          <p:cNvSpPr txBox="1">
+            <a:spLocks noGrp="1"/>
+          </p:cNvSpPr>
           <p:nvPr>
-            <p:ph idx="12" type="sldNum"/>
+            <p:ph type="sldNum" idx="12"/>
           </p:nvPr>
         </p:nvSpPr>
         <p:spPr>
@@ -2820,7 +2901,7 @@
           </a:prstGeom>
         </p:spPr>
         <p:txBody>
-          <a:bodyPr anchorCtr="0" anchor="ctr" bIns="91425" lIns="91425" spcFirstLastPara="1" rIns="91425" wrap="square" tIns="91425">
+          <a:bodyPr spcFirstLastPara="1" wrap="square" lIns="91425" tIns="91425" rIns="91425" bIns="91425" anchor="ctr" anchorCtr="0">
             <a:normAutofit/>
           </a:bodyPr>
           <a:lstStyle>
@@ -2862,7 +2943,7 @@
             </a:lvl9pPr>
           </a:lstStyle>
           <a:p>
-            <a:pPr indent="0" lvl="0" marL="0" rtl="0" algn="r">
+            <a:pPr marL="0" lvl="0" indent="0" algn="r" rtl="0">
               <a:spcBef>
                 <a:spcPts val="0"/>
               </a:spcBef>
@@ -2888,11 +2969,11 @@
 </file>
 
 <file path=ppt/slideLayouts/slideLayout5.xml><?xml version="1.0" encoding="utf-8"?>
-<p:sldLayout xmlns:a="http://schemas.openxmlformats.org/drawingml/2006/main" xmlns:r="http://schemas.openxmlformats.org/officeDocument/2006/relationships" xmlns:mc="http://schemas.openxmlformats.org/markup-compatibility/2006" xmlns:mv="urn:schemas-microsoft-com:mac:vml" xmlns:p="http://schemas.openxmlformats.org/presentationml/2006/main" xmlns:c="http://schemas.openxmlformats.org/drawingml/2006/chart" xmlns:dgm="http://schemas.openxmlformats.org/drawingml/2006/diagram" xmlns:o="urn:schemas-microsoft-com:office:office" xmlns:v="urn:schemas-microsoft-com:vml" xmlns:pvml="urn:schemas-microsoft-com:office:powerpoint" xmlns:com="http://schemas.openxmlformats.org/drawingml/2006/compatibility" xmlns:p14="http://schemas.microsoft.com/office/powerpoint/2010/main" xmlns:p15="http://schemas.microsoft.com/office/powerpoint/2012/main" xmlns:ahyp="http://schemas.microsoft.com/office/drawing/2018/hyperlinkcolor" matchingName="Title only" type="titleOnly">
+<p:sldLayout xmlns:a="http://schemas.openxmlformats.org/drawingml/2006/main" xmlns:r="http://schemas.openxmlformats.org/officeDocument/2006/relationships" xmlns:p="http://schemas.openxmlformats.org/presentationml/2006/main" matchingName="Title only" type="titleOnly">
   <p:cSld name="TITLE_ONLY">
     <p:spTree>
       <p:nvGrpSpPr>
-        <p:cNvPr id="25" name="Shape 25"/>
+        <p:cNvPr id="1" name="Shape 25"/>
         <p:cNvGrpSpPr/>
         <p:nvPr/>
       </p:nvGrpSpPr>
@@ -2907,7 +2988,9 @@
       <p:sp>
         <p:nvSpPr>
           <p:cNvPr id="26" name="Google Shape;26;p6"/>
-          <p:cNvSpPr txBox="1"/>
+          <p:cNvSpPr txBox="1">
+            <a:spLocks noGrp="1"/>
+          </p:cNvSpPr>
           <p:nvPr>
             <p:ph type="title"/>
           </p:nvPr>
@@ -2922,7 +3005,7 @@
           </a:prstGeom>
         </p:spPr>
         <p:txBody>
-          <a:bodyPr anchorCtr="0" anchor="t" bIns="91425" lIns="91425" spcFirstLastPara="1" rIns="91425" wrap="square" tIns="91425">
+          <a:bodyPr spcFirstLastPara="1" wrap="square" lIns="91425" tIns="91425" rIns="91425" bIns="91425" anchor="t" anchorCtr="0">
             <a:normAutofit/>
           </a:bodyPr>
           <a:lstStyle>
@@ -3026,15 +3109,19 @@
               <a:defRPr/>
             </a:lvl9pPr>
           </a:lstStyle>
-          <a:p/>
+          <a:p>
+            <a:endParaRPr/>
+          </a:p>
         </p:txBody>
       </p:sp>
       <p:sp>
         <p:nvSpPr>
           <p:cNvPr id="27" name="Google Shape;27;p6"/>
-          <p:cNvSpPr txBox="1"/>
+          <p:cNvSpPr txBox="1">
+            <a:spLocks noGrp="1"/>
+          </p:cNvSpPr>
           <p:nvPr>
-            <p:ph idx="12" type="sldNum"/>
+            <p:ph type="sldNum" idx="12"/>
           </p:nvPr>
         </p:nvSpPr>
         <p:spPr>
@@ -3047,7 +3134,7 @@
           </a:prstGeom>
         </p:spPr>
         <p:txBody>
-          <a:bodyPr anchorCtr="0" anchor="ctr" bIns="91425" lIns="91425" spcFirstLastPara="1" rIns="91425" wrap="square" tIns="91425">
+          <a:bodyPr spcFirstLastPara="1" wrap="square" lIns="91425" tIns="91425" rIns="91425" bIns="91425" anchor="ctr" anchorCtr="0">
             <a:normAutofit/>
           </a:bodyPr>
           <a:lstStyle>
@@ -3089,7 +3176,7 @@
             </a:lvl9pPr>
           </a:lstStyle>
           <a:p>
-            <a:pPr indent="0" lvl="0" marL="0" rtl="0" algn="r">
+            <a:pPr marL="0" lvl="0" indent="0" algn="r" rtl="0">
               <a:spcBef>
                 <a:spcPts val="0"/>
               </a:spcBef>
@@ -3115,11 +3202,11 @@
 </file>
 
 <file path=ppt/slideLayouts/slideLayout6.xml><?xml version="1.0" encoding="utf-8"?>
-<p:sldLayout xmlns:a="http://schemas.openxmlformats.org/drawingml/2006/main" xmlns:r="http://schemas.openxmlformats.org/officeDocument/2006/relationships" xmlns:mc="http://schemas.openxmlformats.org/markup-compatibility/2006" xmlns:mv="urn:schemas-microsoft-com:mac:vml" xmlns:p="http://schemas.openxmlformats.org/presentationml/2006/main" xmlns:c="http://schemas.openxmlformats.org/drawingml/2006/chart" xmlns:dgm="http://schemas.openxmlformats.org/drawingml/2006/diagram" xmlns:o="urn:schemas-microsoft-com:office:office" xmlns:v="urn:schemas-microsoft-com:vml" xmlns:pvml="urn:schemas-microsoft-com:office:powerpoint" xmlns:com="http://schemas.openxmlformats.org/drawingml/2006/compatibility" xmlns:p14="http://schemas.microsoft.com/office/powerpoint/2010/main" xmlns:p15="http://schemas.microsoft.com/office/powerpoint/2012/main" xmlns:ahyp="http://schemas.microsoft.com/office/drawing/2018/hyperlinkcolor" matchingName="One column text">
+<p:sldLayout xmlns:a="http://schemas.openxmlformats.org/drawingml/2006/main" xmlns:r="http://schemas.openxmlformats.org/officeDocument/2006/relationships" xmlns:p="http://schemas.openxmlformats.org/presentationml/2006/main" matchingName="One column text">
   <p:cSld name="ONE_COLUMN_TEXT">
     <p:spTree>
       <p:nvGrpSpPr>
-        <p:cNvPr id="28" name="Shape 28"/>
+        <p:cNvPr id="1" name="Shape 28"/>
         <p:cNvGrpSpPr/>
         <p:nvPr/>
       </p:nvGrpSpPr>
@@ -3134,7 +3221,9 @@
       <p:sp>
         <p:nvSpPr>
           <p:cNvPr id="29" name="Google Shape;29;p7"/>
-          <p:cNvSpPr txBox="1"/>
+          <p:cNvSpPr txBox="1">
+            <a:spLocks noGrp="1"/>
+          </p:cNvSpPr>
           <p:nvPr>
             <p:ph type="title"/>
           </p:nvPr>
@@ -3149,7 +3238,7 @@
           </a:prstGeom>
         </p:spPr>
         <p:txBody>
-          <a:bodyPr anchorCtr="0" anchor="b" bIns="91425" lIns="91425" spcFirstLastPara="1" rIns="91425" wrap="square" tIns="91425">
+          <a:bodyPr spcFirstLastPara="1" wrap="square" lIns="91425" tIns="91425" rIns="91425" bIns="91425" anchor="b" anchorCtr="0">
             <a:normAutofit/>
           </a:bodyPr>
           <a:lstStyle>
@@ -3253,15 +3342,19 @@
               <a:defRPr sz="2400"/>
             </a:lvl9pPr>
           </a:lstStyle>
-          <a:p/>
+          <a:p>
+            <a:endParaRPr/>
+          </a:p>
         </p:txBody>
       </p:sp>
       <p:sp>
         <p:nvSpPr>
           <p:cNvPr id="30" name="Google Shape;30;p7"/>
-          <p:cNvSpPr txBox="1"/>
+          <p:cNvSpPr txBox="1">
+            <a:spLocks noGrp="1"/>
+          </p:cNvSpPr>
           <p:nvPr>
-            <p:ph idx="1" type="body"/>
+            <p:ph type="body" idx="1"/>
           </p:nvPr>
         </p:nvSpPr>
         <p:spPr>
@@ -3274,11 +3367,11 @@
           </a:prstGeom>
         </p:spPr>
         <p:txBody>
-          <a:bodyPr anchorCtr="0" anchor="t" bIns="91425" lIns="91425" spcFirstLastPara="1" rIns="91425" wrap="square" tIns="91425">
+          <a:bodyPr spcFirstLastPara="1" wrap="square" lIns="91425" tIns="91425" rIns="91425" bIns="91425" anchor="t" anchorCtr="0">
             <a:normAutofit/>
           </a:bodyPr>
           <a:lstStyle>
-            <a:lvl1pPr indent="-304800" lvl="0" marL="457200">
+            <a:lvl1pPr marL="457200" lvl="0" indent="-304800">
               <a:spcBef>
                 <a:spcPts val="0"/>
               </a:spcBef>
@@ -3289,7 +3382,7 @@
               <a:buChar char="●"/>
               <a:defRPr sz="1200"/>
             </a:lvl1pPr>
-            <a:lvl2pPr indent="-304800" lvl="1" marL="914400">
+            <a:lvl2pPr marL="914400" lvl="1" indent="-304800">
               <a:spcBef>
                 <a:spcPts val="0"/>
               </a:spcBef>
@@ -3300,7 +3393,7 @@
               <a:buChar char="○"/>
               <a:defRPr sz="1200"/>
             </a:lvl2pPr>
-            <a:lvl3pPr indent="-304800" lvl="2" marL="1371600">
+            <a:lvl3pPr marL="1371600" lvl="2" indent="-304800">
               <a:spcBef>
                 <a:spcPts val="0"/>
               </a:spcBef>
@@ -3311,7 +3404,7 @@
               <a:buChar char="■"/>
               <a:defRPr sz="1200"/>
             </a:lvl3pPr>
-            <a:lvl4pPr indent="-304800" lvl="3" marL="1828800">
+            <a:lvl4pPr marL="1828800" lvl="3" indent="-304800">
               <a:spcBef>
                 <a:spcPts val="0"/>
               </a:spcBef>
@@ -3322,7 +3415,7 @@
               <a:buChar char="●"/>
               <a:defRPr sz="1200"/>
             </a:lvl4pPr>
-            <a:lvl5pPr indent="-304800" lvl="4" marL="2286000">
+            <a:lvl5pPr marL="2286000" lvl="4" indent="-304800">
               <a:spcBef>
                 <a:spcPts val="0"/>
               </a:spcBef>
@@ -3333,7 +3426,7 @@
               <a:buChar char="○"/>
               <a:defRPr sz="1200"/>
             </a:lvl5pPr>
-            <a:lvl6pPr indent="-304800" lvl="5" marL="2743200">
+            <a:lvl6pPr marL="2743200" lvl="5" indent="-304800">
               <a:spcBef>
                 <a:spcPts val="0"/>
               </a:spcBef>
@@ -3344,7 +3437,7 @@
               <a:buChar char="■"/>
               <a:defRPr sz="1200"/>
             </a:lvl6pPr>
-            <a:lvl7pPr indent="-304800" lvl="6" marL="3200400">
+            <a:lvl7pPr marL="3200400" lvl="6" indent="-304800">
               <a:spcBef>
                 <a:spcPts val="0"/>
               </a:spcBef>
@@ -3355,7 +3448,7 @@
               <a:buChar char="●"/>
               <a:defRPr sz="1200"/>
             </a:lvl7pPr>
-            <a:lvl8pPr indent="-304800" lvl="7" marL="3657600">
+            <a:lvl8pPr marL="3657600" lvl="7" indent="-304800">
               <a:spcBef>
                 <a:spcPts val="0"/>
               </a:spcBef>
@@ -3366,7 +3459,7 @@
               <a:buChar char="○"/>
               <a:defRPr sz="1200"/>
             </a:lvl8pPr>
-            <a:lvl9pPr indent="-304800" lvl="8" marL="4114800">
+            <a:lvl9pPr marL="4114800" lvl="8" indent="-304800">
               <a:spcBef>
                 <a:spcPts val="0"/>
               </a:spcBef>
@@ -3378,15 +3471,19 @@
               <a:defRPr sz="1200"/>
             </a:lvl9pPr>
           </a:lstStyle>
-          <a:p/>
+          <a:p>
+            <a:endParaRPr/>
+          </a:p>
         </p:txBody>
       </p:sp>
       <p:sp>
         <p:nvSpPr>
           <p:cNvPr id="31" name="Google Shape;31;p7"/>
-          <p:cNvSpPr txBox="1"/>
+          <p:cNvSpPr txBox="1">
+            <a:spLocks noGrp="1"/>
+          </p:cNvSpPr>
           <p:nvPr>
-            <p:ph idx="12" type="sldNum"/>
+            <p:ph type="sldNum" idx="12"/>
           </p:nvPr>
         </p:nvSpPr>
         <p:spPr>
@@ -3399,7 +3496,7 @@
           </a:prstGeom>
         </p:spPr>
         <p:txBody>
-          <a:bodyPr anchorCtr="0" anchor="ctr" bIns="91425" lIns="91425" spcFirstLastPara="1" rIns="91425" wrap="square" tIns="91425">
+          <a:bodyPr spcFirstLastPara="1" wrap="square" lIns="91425" tIns="91425" rIns="91425" bIns="91425" anchor="ctr" anchorCtr="0">
             <a:normAutofit/>
           </a:bodyPr>
           <a:lstStyle>
@@ -3441,7 +3538,7 @@
             </a:lvl9pPr>
           </a:lstStyle>
           <a:p>
-            <a:pPr indent="0" lvl="0" marL="0" rtl="0" algn="r">
+            <a:pPr marL="0" lvl="0" indent="0" algn="r" rtl="0">
               <a:spcBef>
                 <a:spcPts val="0"/>
               </a:spcBef>
@@ -3467,11 +3564,11 @@
 </file>
 
 <file path=ppt/slideLayouts/slideLayout7.xml><?xml version="1.0" encoding="utf-8"?>
-<p:sldLayout xmlns:a="http://schemas.openxmlformats.org/drawingml/2006/main" xmlns:r="http://schemas.openxmlformats.org/officeDocument/2006/relationships" xmlns:mc="http://schemas.openxmlformats.org/markup-compatibility/2006" xmlns:mv="urn:schemas-microsoft-com:mac:vml" xmlns:p="http://schemas.openxmlformats.org/presentationml/2006/main" xmlns:c="http://schemas.openxmlformats.org/drawingml/2006/chart" xmlns:dgm="http://schemas.openxmlformats.org/drawingml/2006/diagram" xmlns:o="urn:schemas-microsoft-com:office:office" xmlns:v="urn:schemas-microsoft-com:vml" xmlns:pvml="urn:schemas-microsoft-com:office:powerpoint" xmlns:com="http://schemas.openxmlformats.org/drawingml/2006/compatibility" xmlns:p14="http://schemas.microsoft.com/office/powerpoint/2010/main" xmlns:p15="http://schemas.microsoft.com/office/powerpoint/2012/main" xmlns:ahyp="http://schemas.microsoft.com/office/drawing/2018/hyperlinkcolor" matchingName="Main point">
+<p:sldLayout xmlns:a="http://schemas.openxmlformats.org/drawingml/2006/main" xmlns:r="http://schemas.openxmlformats.org/officeDocument/2006/relationships" xmlns:p="http://schemas.openxmlformats.org/presentationml/2006/main" matchingName="Main point">
   <p:cSld name="MAIN_POINT">
     <p:spTree>
       <p:nvGrpSpPr>
-        <p:cNvPr id="32" name="Shape 32"/>
+        <p:cNvPr id="1" name="Shape 32"/>
         <p:cNvGrpSpPr/>
         <p:nvPr/>
       </p:nvGrpSpPr>
@@ -3486,7 +3583,9 @@
       <p:sp>
         <p:nvSpPr>
           <p:cNvPr id="33" name="Google Shape;33;p8"/>
-          <p:cNvSpPr txBox="1"/>
+          <p:cNvSpPr txBox="1">
+            <a:spLocks noGrp="1"/>
+          </p:cNvSpPr>
           <p:nvPr>
             <p:ph type="title"/>
           </p:nvPr>
@@ -3501,7 +3600,7 @@
           </a:prstGeom>
         </p:spPr>
         <p:txBody>
-          <a:bodyPr anchorCtr="0" anchor="ctr" bIns="91425" lIns="91425" spcFirstLastPara="1" rIns="91425" wrap="square" tIns="91425">
+          <a:bodyPr spcFirstLastPara="1" wrap="square" lIns="91425" tIns="91425" rIns="91425" bIns="91425" anchor="ctr" anchorCtr="0">
             <a:normAutofit/>
           </a:bodyPr>
           <a:lstStyle>
@@ -3605,15 +3704,19 @@
               <a:defRPr sz="4800"/>
             </a:lvl9pPr>
           </a:lstStyle>
-          <a:p/>
+          <a:p>
+            <a:endParaRPr/>
+          </a:p>
         </p:txBody>
       </p:sp>
       <p:sp>
         <p:nvSpPr>
           <p:cNvPr id="34" name="Google Shape;34;p8"/>
-          <p:cNvSpPr txBox="1"/>
+          <p:cNvSpPr txBox="1">
+            <a:spLocks noGrp="1"/>
+          </p:cNvSpPr>
           <p:nvPr>
-            <p:ph idx="12" type="sldNum"/>
+            <p:ph type="sldNum" idx="12"/>
           </p:nvPr>
         </p:nvSpPr>
         <p:spPr>
@@ -3626,7 +3729,7 @@
           </a:prstGeom>
         </p:spPr>
         <p:txBody>
-          <a:bodyPr anchorCtr="0" anchor="ctr" bIns="91425" lIns="91425" spcFirstLastPara="1" rIns="91425" wrap="square" tIns="91425">
+          <a:bodyPr spcFirstLastPara="1" wrap="square" lIns="91425" tIns="91425" rIns="91425" bIns="91425" anchor="ctr" anchorCtr="0">
             <a:normAutofit/>
           </a:bodyPr>
           <a:lstStyle>
@@ -3668,7 +3771,7 @@
             </a:lvl9pPr>
           </a:lstStyle>
           <a:p>
-            <a:pPr indent="0" lvl="0" marL="0" rtl="0" algn="r">
+            <a:pPr marL="0" lvl="0" indent="0" algn="r" rtl="0">
               <a:spcBef>
                 <a:spcPts val="0"/>
               </a:spcBef>
@@ -3694,11 +3797,11 @@
 </file>
 
 <file path=ppt/slideLayouts/slideLayout8.xml><?xml version="1.0" encoding="utf-8"?>
-<p:sldLayout xmlns:a="http://schemas.openxmlformats.org/drawingml/2006/main" xmlns:r="http://schemas.openxmlformats.org/officeDocument/2006/relationships" xmlns:mc="http://schemas.openxmlformats.org/markup-compatibility/2006" xmlns:mv="urn:schemas-microsoft-com:mac:vml" xmlns:p="http://schemas.openxmlformats.org/presentationml/2006/main" xmlns:c="http://schemas.openxmlformats.org/drawingml/2006/chart" xmlns:dgm="http://schemas.openxmlformats.org/drawingml/2006/diagram" xmlns:o="urn:schemas-microsoft-com:office:office" xmlns:v="urn:schemas-microsoft-com:vml" xmlns:pvml="urn:schemas-microsoft-com:office:powerpoint" xmlns:com="http://schemas.openxmlformats.org/drawingml/2006/compatibility" xmlns:p14="http://schemas.microsoft.com/office/powerpoint/2010/main" xmlns:p15="http://schemas.microsoft.com/office/powerpoint/2012/main" xmlns:ahyp="http://schemas.microsoft.com/office/drawing/2018/hyperlinkcolor" matchingName="Section title and description">
+<p:sldLayout xmlns:a="http://schemas.openxmlformats.org/drawingml/2006/main" xmlns:r="http://schemas.openxmlformats.org/officeDocument/2006/relationships" xmlns:p="http://schemas.openxmlformats.org/presentationml/2006/main" matchingName="Section title and description">
   <p:cSld name="SECTION_TITLE_AND_DESCRIPTION">
     <p:spTree>
       <p:nvGrpSpPr>
-        <p:cNvPr id="35" name="Shape 35"/>
+        <p:cNvPr id="1" name="Shape 35"/>
         <p:cNvGrpSpPr/>
         <p:nvPr/>
       </p:nvGrpSpPr>
@@ -3732,12 +3835,12 @@
           </a:ln>
         </p:spPr>
         <p:txBody>
-          <a:bodyPr anchorCtr="0" anchor="ctr" bIns="91425" lIns="91425" spcFirstLastPara="1" rIns="91425" wrap="square" tIns="91425">
+          <a:bodyPr spcFirstLastPara="1" wrap="square" lIns="91425" tIns="91425" rIns="91425" bIns="91425" anchor="ctr" anchorCtr="0">
             <a:noAutofit/>
           </a:bodyPr>
           <a:lstStyle/>
           <a:p>
-            <a:pPr indent="0" lvl="0" marL="0" rtl="0" algn="l">
+            <a:pPr marL="0" lvl="0" indent="0" algn="l" rtl="0">
               <a:spcBef>
                 <a:spcPts val="0"/>
               </a:spcBef>
@@ -3746,9 +3849,6 @@
               </a:spcAft>
               <a:buNone/>
             </a:pPr>
-            <a:r>
-              <a:t/>
-            </a:r>
             <a:endParaRPr/>
           </a:p>
         </p:txBody>
@@ -3756,7 +3856,9 @@
       <p:sp>
         <p:nvSpPr>
           <p:cNvPr id="37" name="Google Shape;37;p9"/>
-          <p:cNvSpPr txBox="1"/>
+          <p:cNvSpPr txBox="1">
+            <a:spLocks noGrp="1"/>
+          </p:cNvSpPr>
           <p:nvPr>
             <p:ph type="title"/>
           </p:nvPr>
@@ -3771,7 +3873,7 @@
           </a:prstGeom>
         </p:spPr>
         <p:txBody>
-          <a:bodyPr anchorCtr="0" anchor="b" bIns="91425" lIns="91425" spcFirstLastPara="1" rIns="91425" wrap="square" tIns="91425">
+          <a:bodyPr spcFirstLastPara="1" wrap="square" lIns="91425" tIns="91425" rIns="91425" bIns="91425" anchor="b" anchorCtr="0">
             <a:normAutofit/>
           </a:bodyPr>
           <a:lstStyle>
@@ -3875,15 +3977,19 @@
               <a:defRPr sz="4200"/>
             </a:lvl9pPr>
           </a:lstStyle>
-          <a:p/>
+          <a:p>
+            <a:endParaRPr/>
+          </a:p>
         </p:txBody>
       </p:sp>
       <p:sp>
         <p:nvSpPr>
           <p:cNvPr id="38" name="Google Shape;38;p9"/>
-          <p:cNvSpPr txBox="1"/>
+          <p:cNvSpPr txBox="1">
+            <a:spLocks noGrp="1"/>
+          </p:cNvSpPr>
           <p:nvPr>
-            <p:ph idx="1" type="subTitle"/>
+            <p:ph type="subTitle" idx="1"/>
           </p:nvPr>
         </p:nvSpPr>
         <p:spPr>
@@ -3896,7 +4002,7 @@
           </a:prstGeom>
         </p:spPr>
         <p:txBody>
-          <a:bodyPr anchorCtr="0" anchor="t" bIns="91425" lIns="91425" spcFirstLastPara="1" rIns="91425" wrap="square" tIns="91425">
+          <a:bodyPr spcFirstLastPara="1" wrap="square" lIns="91425" tIns="91425" rIns="91425" bIns="91425" anchor="t" anchorCtr="0">
             <a:normAutofit/>
           </a:bodyPr>
           <a:lstStyle>
@@ -4027,15 +4133,19 @@
               <a:defRPr sz="2100"/>
             </a:lvl9pPr>
           </a:lstStyle>
-          <a:p/>
+          <a:p>
+            <a:endParaRPr/>
+          </a:p>
         </p:txBody>
       </p:sp>
       <p:sp>
         <p:nvSpPr>
           <p:cNvPr id="39" name="Google Shape;39;p9"/>
-          <p:cNvSpPr txBox="1"/>
+          <p:cNvSpPr txBox="1">
+            <a:spLocks noGrp="1"/>
+          </p:cNvSpPr>
           <p:nvPr>
-            <p:ph idx="2" type="body"/>
+            <p:ph type="body" idx="2"/>
           </p:nvPr>
         </p:nvSpPr>
         <p:spPr>
@@ -4048,11 +4158,11 @@
           </a:prstGeom>
         </p:spPr>
         <p:txBody>
-          <a:bodyPr anchorCtr="0" anchor="ctr" bIns="91425" lIns="91425" spcFirstLastPara="1" rIns="91425" wrap="square" tIns="91425">
+          <a:bodyPr spcFirstLastPara="1" wrap="square" lIns="91425" tIns="91425" rIns="91425" bIns="91425" anchor="ctr" anchorCtr="0">
             <a:normAutofit/>
           </a:bodyPr>
           <a:lstStyle>
-            <a:lvl1pPr indent="-342900" lvl="0" marL="457200">
+            <a:lvl1pPr marL="457200" lvl="0" indent="-342900">
               <a:spcBef>
                 <a:spcPts val="0"/>
               </a:spcBef>
@@ -4063,7 +4173,7 @@
               <a:buChar char="●"/>
               <a:defRPr/>
             </a:lvl1pPr>
-            <a:lvl2pPr indent="-317500" lvl="1" marL="914400">
+            <a:lvl2pPr marL="914400" lvl="1" indent="-317500">
               <a:spcBef>
                 <a:spcPts val="0"/>
               </a:spcBef>
@@ -4074,7 +4184,7 @@
               <a:buChar char="○"/>
               <a:defRPr/>
             </a:lvl2pPr>
-            <a:lvl3pPr indent="-317500" lvl="2" marL="1371600">
+            <a:lvl3pPr marL="1371600" lvl="2" indent="-317500">
               <a:spcBef>
                 <a:spcPts val="0"/>
               </a:spcBef>
@@ -4085,7 +4195,7 @@
               <a:buChar char="■"/>
               <a:defRPr/>
             </a:lvl3pPr>
-            <a:lvl4pPr indent="-317500" lvl="3" marL="1828800">
+            <a:lvl4pPr marL="1828800" lvl="3" indent="-317500">
               <a:spcBef>
                 <a:spcPts val="0"/>
               </a:spcBef>
@@ -4096,7 +4206,7 @@
               <a:buChar char="●"/>
               <a:defRPr/>
             </a:lvl4pPr>
-            <a:lvl5pPr indent="-317500" lvl="4" marL="2286000">
+            <a:lvl5pPr marL="2286000" lvl="4" indent="-317500">
               <a:spcBef>
                 <a:spcPts val="0"/>
               </a:spcBef>
@@ -4107,7 +4217,7 @@
               <a:buChar char="○"/>
               <a:defRPr/>
             </a:lvl5pPr>
-            <a:lvl6pPr indent="-317500" lvl="5" marL="2743200">
+            <a:lvl6pPr marL="2743200" lvl="5" indent="-317500">
               <a:spcBef>
                 <a:spcPts val="0"/>
               </a:spcBef>
@@ -4118,7 +4228,7 @@
               <a:buChar char="■"/>
               <a:defRPr/>
             </a:lvl6pPr>
-            <a:lvl7pPr indent="-317500" lvl="6" marL="3200400">
+            <a:lvl7pPr marL="3200400" lvl="6" indent="-317500">
               <a:spcBef>
                 <a:spcPts val="0"/>
               </a:spcBef>
@@ -4129,7 +4239,7 @@
               <a:buChar char="●"/>
               <a:defRPr/>
             </a:lvl7pPr>
-            <a:lvl8pPr indent="-317500" lvl="7" marL="3657600">
+            <a:lvl8pPr marL="3657600" lvl="7" indent="-317500">
               <a:spcBef>
                 <a:spcPts val="0"/>
               </a:spcBef>
@@ -4140,7 +4250,7 @@
               <a:buChar char="○"/>
               <a:defRPr/>
             </a:lvl8pPr>
-            <a:lvl9pPr indent="-317500" lvl="8" marL="4114800">
+            <a:lvl9pPr marL="4114800" lvl="8" indent="-317500">
               <a:spcBef>
                 <a:spcPts val="0"/>
               </a:spcBef>
@@ -4152,15 +4262,19 @@
               <a:defRPr/>
             </a:lvl9pPr>
           </a:lstStyle>
-          <a:p/>
+          <a:p>
+            <a:endParaRPr/>
+          </a:p>
         </p:txBody>
       </p:sp>
       <p:sp>
         <p:nvSpPr>
           <p:cNvPr id="40" name="Google Shape;40;p9"/>
-          <p:cNvSpPr txBox="1"/>
+          <p:cNvSpPr txBox="1">
+            <a:spLocks noGrp="1"/>
+          </p:cNvSpPr>
           <p:nvPr>
-            <p:ph idx="12" type="sldNum"/>
+            <p:ph type="sldNum" idx="12"/>
           </p:nvPr>
         </p:nvSpPr>
         <p:spPr>
@@ -4173,7 +4287,7 @@
           </a:prstGeom>
         </p:spPr>
         <p:txBody>
-          <a:bodyPr anchorCtr="0" anchor="ctr" bIns="91425" lIns="91425" spcFirstLastPara="1" rIns="91425" wrap="square" tIns="91425">
+          <a:bodyPr spcFirstLastPara="1" wrap="square" lIns="91425" tIns="91425" rIns="91425" bIns="91425" anchor="ctr" anchorCtr="0">
             <a:normAutofit/>
           </a:bodyPr>
           <a:lstStyle>
@@ -4215,7 +4329,7 @@
             </a:lvl9pPr>
           </a:lstStyle>
           <a:p>
-            <a:pPr indent="0" lvl="0" marL="0" rtl="0" algn="r">
+            <a:pPr marL="0" lvl="0" indent="0" algn="r" rtl="0">
               <a:spcBef>
                 <a:spcPts val="0"/>
               </a:spcBef>
@@ -4241,11 +4355,11 @@
 </file>
 
 <file path=ppt/slideLayouts/slideLayout9.xml><?xml version="1.0" encoding="utf-8"?>
-<p:sldLayout xmlns:a="http://schemas.openxmlformats.org/drawingml/2006/main" xmlns:r="http://schemas.openxmlformats.org/officeDocument/2006/relationships" xmlns:mc="http://schemas.openxmlformats.org/markup-compatibility/2006" xmlns:mv="urn:schemas-microsoft-com:mac:vml" xmlns:p="http://schemas.openxmlformats.org/presentationml/2006/main" xmlns:c="http://schemas.openxmlformats.org/drawingml/2006/chart" xmlns:dgm="http://schemas.openxmlformats.org/drawingml/2006/diagram" xmlns:o="urn:schemas-microsoft-com:office:office" xmlns:v="urn:schemas-microsoft-com:vml" xmlns:pvml="urn:schemas-microsoft-com:office:powerpoint" xmlns:com="http://schemas.openxmlformats.org/drawingml/2006/compatibility" xmlns:p14="http://schemas.microsoft.com/office/powerpoint/2010/main" xmlns:p15="http://schemas.microsoft.com/office/powerpoint/2012/main" xmlns:ahyp="http://schemas.microsoft.com/office/drawing/2018/hyperlinkcolor" matchingName="Caption">
+<p:sldLayout xmlns:a="http://schemas.openxmlformats.org/drawingml/2006/main" xmlns:r="http://schemas.openxmlformats.org/officeDocument/2006/relationships" xmlns:p="http://schemas.openxmlformats.org/presentationml/2006/main" matchingName="Caption">
   <p:cSld name="CAPTION_ONLY">
     <p:spTree>
       <p:nvGrpSpPr>
-        <p:cNvPr id="41" name="Shape 41"/>
+        <p:cNvPr id="1" name="Shape 41"/>
         <p:cNvGrpSpPr/>
         <p:nvPr/>
       </p:nvGrpSpPr>
@@ -4260,9 +4374,11 @@
       <p:sp>
         <p:nvSpPr>
           <p:cNvPr id="42" name="Google Shape;42;p10"/>
-          <p:cNvSpPr txBox="1"/>
+          <p:cNvSpPr txBox="1">
+            <a:spLocks noGrp="1"/>
+          </p:cNvSpPr>
           <p:nvPr>
-            <p:ph idx="1" type="body"/>
+            <p:ph type="body" idx="1"/>
           </p:nvPr>
         </p:nvSpPr>
         <p:spPr>
@@ -4275,11 +4391,11 @@
           </a:prstGeom>
         </p:spPr>
         <p:txBody>
-          <a:bodyPr anchorCtr="0" anchor="ctr" bIns="91425" lIns="91425" spcFirstLastPara="1" rIns="91425" wrap="square" tIns="91425">
+          <a:bodyPr spcFirstLastPara="1" wrap="square" lIns="91425" tIns="91425" rIns="91425" bIns="91425" anchor="ctr" anchorCtr="0">
             <a:normAutofit/>
           </a:bodyPr>
           <a:lstStyle>
-            <a:lvl1pPr indent="-228600" lvl="0" marL="457200">
+            <a:lvl1pPr marL="457200" lvl="0" indent="-228600">
               <a:lnSpc>
                 <a:spcPct val="100000"/>
               </a:lnSpc>
@@ -4294,15 +4410,19 @@
               <a:defRPr/>
             </a:lvl1pPr>
           </a:lstStyle>
-          <a:p/>
+          <a:p>
+            <a:endParaRPr/>
+          </a:p>
         </p:txBody>
       </p:sp>
       <p:sp>
         <p:nvSpPr>
           <p:cNvPr id="43" name="Google Shape;43;p10"/>
-          <p:cNvSpPr txBox="1"/>
+          <p:cNvSpPr txBox="1">
+            <a:spLocks noGrp="1"/>
+          </p:cNvSpPr>
           <p:nvPr>
-            <p:ph idx="12" type="sldNum"/>
+            <p:ph type="sldNum" idx="12"/>
           </p:nvPr>
         </p:nvSpPr>
         <p:spPr>
@@ -4315,7 +4435,7 @@
           </a:prstGeom>
         </p:spPr>
         <p:txBody>
-          <a:bodyPr anchorCtr="0" anchor="ctr" bIns="91425" lIns="91425" spcFirstLastPara="1" rIns="91425" wrap="square" tIns="91425">
+          <a:bodyPr spcFirstLastPara="1" wrap="square" lIns="91425" tIns="91425" rIns="91425" bIns="91425" anchor="ctr" anchorCtr="0">
             <a:normAutofit/>
           </a:bodyPr>
           <a:lstStyle>
@@ -4357,7 +4477,7 @@
             </a:lvl9pPr>
           </a:lstStyle>
           <a:p>
-            <a:pPr indent="0" lvl="0" marL="0" rtl="0" algn="r">
+            <a:pPr marL="0" lvl="0" indent="0" algn="r" rtl="0">
               <a:spcBef>
                 <a:spcPts val="0"/>
               </a:spcBef>
@@ -4383,18 +4503,19 @@
 </file>
 
 <file path=ppt/slideMasters/slideMaster1.xml><?xml version="1.0" encoding="utf-8"?>
-<p:sldMaster xmlns:a="http://schemas.openxmlformats.org/drawingml/2006/main" xmlns:r="http://schemas.openxmlformats.org/officeDocument/2006/relationships" xmlns:mc="http://schemas.openxmlformats.org/markup-compatibility/2006" xmlns:mv="urn:schemas-microsoft-com:mac:vml" xmlns:p="http://schemas.openxmlformats.org/presentationml/2006/main" xmlns:c="http://schemas.openxmlformats.org/drawingml/2006/chart" xmlns:dgm="http://schemas.openxmlformats.org/drawingml/2006/diagram" xmlns:o="urn:schemas-microsoft-com:office:office" xmlns:v="urn:schemas-microsoft-com:vml" xmlns:pvml="urn:schemas-microsoft-com:office:powerpoint" xmlns:com="http://schemas.openxmlformats.org/drawingml/2006/compatibility" xmlns:p14="http://schemas.microsoft.com/office/powerpoint/2010/main" xmlns:p15="http://schemas.microsoft.com/office/powerpoint/2012/main" xmlns:ahyp="http://schemas.microsoft.com/office/drawing/2018/hyperlinkcolor">
+<p:sldMaster xmlns:a="http://schemas.openxmlformats.org/drawingml/2006/main" xmlns:r="http://schemas.openxmlformats.org/officeDocument/2006/relationships" xmlns:p="http://schemas.openxmlformats.org/presentationml/2006/main">
   <p:cSld name="simple-light-2">
     <p:bg>
       <p:bgPr>
         <a:solidFill>
           <a:schemeClr val="lt1"/>
         </a:solidFill>
+        <a:effectLst/>
       </p:bgPr>
     </p:bg>
     <p:spTree>
       <p:nvGrpSpPr>
-        <p:cNvPr id="5" name="Shape 5"/>
+        <p:cNvPr id="1" name="Shape 5"/>
         <p:cNvGrpSpPr/>
         <p:nvPr/>
       </p:nvGrpSpPr>
@@ -4409,7 +4530,9 @@
       <p:sp>
         <p:nvSpPr>
           <p:cNvPr id="6" name="Google Shape;6;p1"/>
-          <p:cNvSpPr txBox="1"/>
+          <p:cNvSpPr txBox="1">
+            <a:spLocks noGrp="1"/>
+          </p:cNvSpPr>
           <p:nvPr>
             <p:ph type="title"/>
           </p:nvPr>
@@ -4428,7 +4551,7 @@
           </a:ln>
         </p:spPr>
         <p:txBody>
-          <a:bodyPr anchorCtr="0" anchor="t" bIns="91425" lIns="91425" spcFirstLastPara="1" rIns="91425" wrap="square" tIns="91425">
+          <a:bodyPr spcFirstLastPara="1" wrap="square" lIns="91425" tIns="91425" rIns="91425" bIns="91425" anchor="t" anchorCtr="0">
             <a:normAutofit/>
           </a:bodyPr>
           <a:lstStyle>
@@ -4595,15 +4718,19 @@
               </a:defRPr>
             </a:lvl9pPr>
           </a:lstStyle>
-          <a:p/>
+          <a:p>
+            <a:endParaRPr/>
+          </a:p>
         </p:txBody>
       </p:sp>
       <p:sp>
         <p:nvSpPr>
           <p:cNvPr id="7" name="Google Shape;7;p1"/>
-          <p:cNvSpPr txBox="1"/>
+          <p:cNvSpPr txBox="1">
+            <a:spLocks noGrp="1"/>
+          </p:cNvSpPr>
           <p:nvPr>
-            <p:ph idx="1" type="body"/>
+            <p:ph type="body" idx="1"/>
           </p:nvPr>
         </p:nvSpPr>
         <p:spPr>
@@ -4620,11 +4747,11 @@
           </a:ln>
         </p:spPr>
         <p:txBody>
-          <a:bodyPr anchorCtr="0" anchor="t" bIns="91425" lIns="91425" spcFirstLastPara="1" rIns="91425" wrap="square" tIns="91425">
+          <a:bodyPr spcFirstLastPara="1" wrap="square" lIns="91425" tIns="91425" rIns="91425" bIns="91425" anchor="t" anchorCtr="0">
             <a:normAutofit/>
           </a:bodyPr>
           <a:lstStyle>
-            <a:lvl1pPr indent="-342900" lvl="0" marL="457200">
+            <a:lvl1pPr marL="457200" lvl="0" indent="-342900">
               <a:lnSpc>
                 <a:spcPct val="115000"/>
               </a:lnSpc>
@@ -4645,7 +4772,7 @@
                 </a:solidFill>
               </a:defRPr>
             </a:lvl1pPr>
-            <a:lvl2pPr indent="-317500" lvl="1" marL="914400">
+            <a:lvl2pPr marL="914400" lvl="1" indent="-317500">
               <a:lnSpc>
                 <a:spcPct val="115000"/>
               </a:lnSpc>
@@ -4666,7 +4793,7 @@
                 </a:solidFill>
               </a:defRPr>
             </a:lvl2pPr>
-            <a:lvl3pPr indent="-317500" lvl="2" marL="1371600">
+            <a:lvl3pPr marL="1371600" lvl="2" indent="-317500">
               <a:lnSpc>
                 <a:spcPct val="115000"/>
               </a:lnSpc>
@@ -4687,7 +4814,7 @@
                 </a:solidFill>
               </a:defRPr>
             </a:lvl3pPr>
-            <a:lvl4pPr indent="-317500" lvl="3" marL="1828800">
+            <a:lvl4pPr marL="1828800" lvl="3" indent="-317500">
               <a:lnSpc>
                 <a:spcPct val="115000"/>
               </a:lnSpc>
@@ -4708,7 +4835,7 @@
                 </a:solidFill>
               </a:defRPr>
             </a:lvl4pPr>
-            <a:lvl5pPr indent="-317500" lvl="4" marL="2286000">
+            <a:lvl5pPr marL="2286000" lvl="4" indent="-317500">
               <a:lnSpc>
                 <a:spcPct val="115000"/>
               </a:lnSpc>
@@ -4729,7 +4856,7 @@
                 </a:solidFill>
               </a:defRPr>
             </a:lvl5pPr>
-            <a:lvl6pPr indent="-317500" lvl="5" marL="2743200">
+            <a:lvl6pPr marL="2743200" lvl="5" indent="-317500">
               <a:lnSpc>
                 <a:spcPct val="115000"/>
               </a:lnSpc>
@@ -4750,7 +4877,7 @@
                 </a:solidFill>
               </a:defRPr>
             </a:lvl6pPr>
-            <a:lvl7pPr indent="-317500" lvl="6" marL="3200400">
+            <a:lvl7pPr marL="3200400" lvl="6" indent="-317500">
               <a:lnSpc>
                 <a:spcPct val="115000"/>
               </a:lnSpc>
@@ -4771,7 +4898,7 @@
                 </a:solidFill>
               </a:defRPr>
             </a:lvl7pPr>
-            <a:lvl8pPr indent="-317500" lvl="7" marL="3657600">
+            <a:lvl8pPr marL="3657600" lvl="7" indent="-317500">
               <a:lnSpc>
                 <a:spcPct val="115000"/>
               </a:lnSpc>
@@ -4792,7 +4919,7 @@
                 </a:solidFill>
               </a:defRPr>
             </a:lvl8pPr>
-            <a:lvl9pPr indent="-317500" lvl="8" marL="4114800">
+            <a:lvl9pPr marL="4114800" lvl="8" indent="-317500">
               <a:lnSpc>
                 <a:spcPct val="115000"/>
               </a:lnSpc>
@@ -4814,15 +4941,19 @@
               </a:defRPr>
             </a:lvl9pPr>
           </a:lstStyle>
-          <a:p/>
+          <a:p>
+            <a:endParaRPr/>
+          </a:p>
         </p:txBody>
       </p:sp>
       <p:sp>
         <p:nvSpPr>
           <p:cNvPr id="8" name="Google Shape;8;p1"/>
-          <p:cNvSpPr txBox="1"/>
+          <p:cNvSpPr txBox="1">
+            <a:spLocks noGrp="1"/>
+          </p:cNvSpPr>
           <p:nvPr>
-            <p:ph idx="12" type="sldNum"/>
+            <p:ph type="sldNum" idx="12"/>
           </p:nvPr>
         </p:nvSpPr>
         <p:spPr>
@@ -4839,7 +4970,7 @@
           </a:ln>
         </p:spPr>
         <p:txBody>
-          <a:bodyPr anchorCtr="0" anchor="ctr" bIns="91425" lIns="91425" spcFirstLastPara="1" rIns="91425" wrap="square" tIns="91425">
+          <a:bodyPr spcFirstLastPara="1" wrap="square" lIns="91425" tIns="91425" rIns="91425" bIns="91425" anchor="ctr" anchorCtr="0">
             <a:normAutofit/>
           </a:bodyPr>
           <a:lstStyle>
@@ -4917,7 +5048,7 @@
             </a:lvl9pPr>
           </a:lstStyle>
           <a:p>
-            <a:pPr indent="0" lvl="0" marL="0" rtl="0" algn="r">
+            <a:pPr marL="0" lvl="0" indent="0" algn="r" rtl="0">
               <a:spcBef>
                 <a:spcPts val="0"/>
               </a:spcBef>
@@ -4936,7 +5067,7 @@
       </p:sp>
     </p:spTree>
   </p:cSld>
-  <p:clrMap accent1="accent1" accent2="accent2" accent3="accent3" accent4="accent4" accent5="accent5" accent6="accent6" bg1="lt1" bg2="dk2" tx1="dk1" tx2="lt2" folHlink="folHlink" hlink="hlink"/>
+  <p:clrMap bg1="lt1" tx1="dk1" bg2="dk2" tx2="lt2" accent1="accent1" accent2="accent2" accent3="accent3" accent4="accent4" accent5="accent5" accent6="accent6" hlink="hlink" folHlink="folHlink"/>
   <p:sldLayoutIdLst>
     <p:sldLayoutId id="2147483648" r:id="rId1"/>
     <p:sldLayoutId id="2147483649" r:id="rId2"/>
@@ -4950,10 +5081,10 @@
     <p:sldLayoutId id="2147483657" r:id="rId10"/>
     <p:sldLayoutId id="2147483658" r:id="rId11"/>
   </p:sldLayoutIdLst>
-  <p:hf dt="0" ftr="0" hdr="0" sldNum="0"/>
+  <p:hf sldNum="0" hdr="0" ftr="0" dt="0"/>
   <p:txStyles>
     <p:titleStyle>
-      <a:defPPr lvl="0" marR="0" rtl="0" algn="l">
+      <a:defPPr marR="0" lvl="0" algn="l" rtl="0">
         <a:lnSpc>
           <a:spcPct val="100000"/>
         </a:lnSpc>
@@ -4964,7 +5095,7 @@
           <a:spcPts val="0"/>
         </a:spcAft>
       </a:defPPr>
-      <a:lvl1pPr lvl="0" marR="0" rtl="0" algn="l">
+      <a:lvl1pPr marR="0" lvl="0" algn="l" rtl="0">
         <a:lnSpc>
           <a:spcPct val="100000"/>
         </a:lnSpc>
@@ -4978,7 +5109,7 @@
           <a:srgbClr val="000000"/>
         </a:buClr>
         <a:buFont typeface="Arial"/>
-        <a:defRPr b="0" i="0" sz="1400" u="none" cap="none" strike="noStrike">
+        <a:defRPr sz="1400" b="0" i="0" u="none" strike="noStrike" cap="none">
           <a:solidFill>
             <a:srgbClr val="000000"/>
           </a:solidFill>
@@ -4988,7 +5119,7 @@
           <a:sym typeface="Arial"/>
         </a:defRPr>
       </a:lvl1pPr>
-      <a:lvl2pPr lvl="1" marR="0" rtl="0" algn="l">
+      <a:lvl2pPr marR="0" lvl="1" algn="l" rtl="0">
         <a:lnSpc>
           <a:spcPct val="100000"/>
         </a:lnSpc>
@@ -5002,7 +5133,7 @@
           <a:srgbClr val="000000"/>
         </a:buClr>
         <a:buFont typeface="Arial"/>
-        <a:defRPr b="0" i="0" sz="1400" u="none" cap="none" strike="noStrike">
+        <a:defRPr sz="1400" b="0" i="0" u="none" strike="noStrike" cap="none">
           <a:solidFill>
             <a:srgbClr val="000000"/>
           </a:solidFill>
@@ -5012,7 +5143,7 @@
           <a:sym typeface="Arial"/>
         </a:defRPr>
       </a:lvl2pPr>
-      <a:lvl3pPr lvl="2" marR="0" rtl="0" algn="l">
+      <a:lvl3pPr marR="0" lvl="2" algn="l" rtl="0">
         <a:lnSpc>
           <a:spcPct val="100000"/>
         </a:lnSpc>
@@ -5026,7 +5157,7 @@
           <a:srgbClr val="000000"/>
         </a:buClr>
         <a:buFont typeface="Arial"/>
-        <a:defRPr b="0" i="0" sz="1400" u="none" cap="none" strike="noStrike">
+        <a:defRPr sz="1400" b="0" i="0" u="none" strike="noStrike" cap="none">
           <a:solidFill>
             <a:srgbClr val="000000"/>
           </a:solidFill>
@@ -5036,7 +5167,7 @@
           <a:sym typeface="Arial"/>
         </a:defRPr>
       </a:lvl3pPr>
-      <a:lvl4pPr lvl="3" marR="0" rtl="0" algn="l">
+      <a:lvl4pPr marR="0" lvl="3" algn="l" rtl="0">
         <a:lnSpc>
           <a:spcPct val="100000"/>
         </a:lnSpc>
@@ -5050,7 +5181,7 @@
           <a:srgbClr val="000000"/>
         </a:buClr>
         <a:buFont typeface="Arial"/>
-        <a:defRPr b="0" i="0" sz="1400" u="none" cap="none" strike="noStrike">
+        <a:defRPr sz="1400" b="0" i="0" u="none" strike="noStrike" cap="none">
           <a:solidFill>
             <a:srgbClr val="000000"/>
           </a:solidFill>
@@ -5060,7 +5191,7 @@
           <a:sym typeface="Arial"/>
         </a:defRPr>
       </a:lvl4pPr>
-      <a:lvl5pPr lvl="4" marR="0" rtl="0" algn="l">
+      <a:lvl5pPr marR="0" lvl="4" algn="l" rtl="0">
         <a:lnSpc>
           <a:spcPct val="100000"/>
         </a:lnSpc>
@@ -5074,7 +5205,7 @@
           <a:srgbClr val="000000"/>
         </a:buClr>
         <a:buFont typeface="Arial"/>
-        <a:defRPr b="0" i="0" sz="1400" u="none" cap="none" strike="noStrike">
+        <a:defRPr sz="1400" b="0" i="0" u="none" strike="noStrike" cap="none">
           <a:solidFill>
             <a:srgbClr val="000000"/>
           </a:solidFill>
@@ -5084,7 +5215,7 @@
           <a:sym typeface="Arial"/>
         </a:defRPr>
       </a:lvl5pPr>
-      <a:lvl6pPr lvl="5" marR="0" rtl="0" algn="l">
+      <a:lvl6pPr marR="0" lvl="5" algn="l" rtl="0">
         <a:lnSpc>
           <a:spcPct val="100000"/>
         </a:lnSpc>
@@ -5098,7 +5229,7 @@
           <a:srgbClr val="000000"/>
         </a:buClr>
         <a:buFont typeface="Arial"/>
-        <a:defRPr b="0" i="0" sz="1400" u="none" cap="none" strike="noStrike">
+        <a:defRPr sz="1400" b="0" i="0" u="none" strike="noStrike" cap="none">
           <a:solidFill>
             <a:srgbClr val="000000"/>
           </a:solidFill>
@@ -5108,7 +5239,7 @@
           <a:sym typeface="Arial"/>
         </a:defRPr>
       </a:lvl6pPr>
-      <a:lvl7pPr lvl="6" marR="0" rtl="0" algn="l">
+      <a:lvl7pPr marR="0" lvl="6" algn="l" rtl="0">
         <a:lnSpc>
           <a:spcPct val="100000"/>
         </a:lnSpc>
@@ -5122,7 +5253,7 @@
           <a:srgbClr val="000000"/>
         </a:buClr>
         <a:buFont typeface="Arial"/>
-        <a:defRPr b="0" i="0" sz="1400" u="none" cap="none" strike="noStrike">
+        <a:defRPr sz="1400" b="0" i="0" u="none" strike="noStrike" cap="none">
           <a:solidFill>
             <a:srgbClr val="000000"/>
           </a:solidFill>
@@ -5132,7 +5263,7 @@
           <a:sym typeface="Arial"/>
         </a:defRPr>
       </a:lvl7pPr>
-      <a:lvl8pPr lvl="7" marR="0" rtl="0" algn="l">
+      <a:lvl8pPr marR="0" lvl="7" algn="l" rtl="0">
         <a:lnSpc>
           <a:spcPct val="100000"/>
         </a:lnSpc>
@@ -5146,7 +5277,7 @@
           <a:srgbClr val="000000"/>
         </a:buClr>
         <a:buFont typeface="Arial"/>
-        <a:defRPr b="0" i="0" sz="1400" u="none" cap="none" strike="noStrike">
+        <a:defRPr sz="1400" b="0" i="0" u="none" strike="noStrike" cap="none">
           <a:solidFill>
             <a:srgbClr val="000000"/>
           </a:solidFill>
@@ -5156,7 +5287,7 @@
           <a:sym typeface="Arial"/>
         </a:defRPr>
       </a:lvl8pPr>
-      <a:lvl9pPr lvl="8" marR="0" rtl="0" algn="l">
+      <a:lvl9pPr marR="0" lvl="8" algn="l" rtl="0">
         <a:lnSpc>
           <a:spcPct val="100000"/>
         </a:lnSpc>
@@ -5170,7 +5301,7 @@
           <a:srgbClr val="000000"/>
         </a:buClr>
         <a:buFont typeface="Arial"/>
-        <a:defRPr b="0" i="0" sz="1400" u="none" cap="none" strike="noStrike">
+        <a:defRPr sz="1400" b="0" i="0" u="none" strike="noStrike" cap="none">
           <a:solidFill>
             <a:srgbClr val="000000"/>
           </a:solidFill>
@@ -5182,7 +5313,7 @@
       </a:lvl9pPr>
     </p:titleStyle>
     <p:bodyStyle>
-      <a:defPPr lvl="0" marR="0" rtl="0" algn="l">
+      <a:defPPr marR="0" lvl="0" algn="l" rtl="0">
         <a:lnSpc>
           <a:spcPct val="100000"/>
         </a:lnSpc>
@@ -5193,7 +5324,7 @@
           <a:spcPts val="0"/>
         </a:spcAft>
       </a:defPPr>
-      <a:lvl1pPr lvl="0" marR="0" rtl="0" algn="l">
+      <a:lvl1pPr marR="0" lvl="0" algn="l" rtl="0">
         <a:lnSpc>
           <a:spcPct val="100000"/>
         </a:lnSpc>
@@ -5207,7 +5338,7 @@
           <a:srgbClr val="000000"/>
         </a:buClr>
         <a:buFont typeface="Arial"/>
-        <a:defRPr b="0" i="0" sz="1400" u="none" cap="none" strike="noStrike">
+        <a:defRPr sz="1400" b="0" i="0" u="none" strike="noStrike" cap="none">
           <a:solidFill>
             <a:srgbClr val="000000"/>
           </a:solidFill>
@@ -5217,7 +5348,7 @@
           <a:sym typeface="Arial"/>
         </a:defRPr>
       </a:lvl1pPr>
-      <a:lvl2pPr lvl="1" marR="0" rtl="0" algn="l">
+      <a:lvl2pPr marR="0" lvl="1" algn="l" rtl="0">
         <a:lnSpc>
           <a:spcPct val="100000"/>
         </a:lnSpc>
@@ -5231,7 +5362,7 @@
           <a:srgbClr val="000000"/>
         </a:buClr>
         <a:buFont typeface="Arial"/>
-        <a:defRPr b="0" i="0" sz="1400" u="none" cap="none" strike="noStrike">
+        <a:defRPr sz="1400" b="0" i="0" u="none" strike="noStrike" cap="none">
           <a:solidFill>
             <a:srgbClr val="000000"/>
           </a:solidFill>
@@ -5241,7 +5372,7 @@
           <a:sym typeface="Arial"/>
         </a:defRPr>
       </a:lvl2pPr>
-      <a:lvl3pPr lvl="2" marR="0" rtl="0" algn="l">
+      <a:lvl3pPr marR="0" lvl="2" algn="l" rtl="0">
         <a:lnSpc>
           <a:spcPct val="100000"/>
         </a:lnSpc>
@@ -5255,7 +5386,7 @@
           <a:srgbClr val="000000"/>
         </a:buClr>
         <a:buFont typeface="Arial"/>
-        <a:defRPr b="0" i="0" sz="1400" u="none" cap="none" strike="noStrike">
+        <a:defRPr sz="1400" b="0" i="0" u="none" strike="noStrike" cap="none">
           <a:solidFill>
             <a:srgbClr val="000000"/>
           </a:solidFill>
@@ -5265,7 +5396,7 @@
           <a:sym typeface="Arial"/>
         </a:defRPr>
       </a:lvl3pPr>
-      <a:lvl4pPr lvl="3" marR="0" rtl="0" algn="l">
+      <a:lvl4pPr marR="0" lvl="3" algn="l" rtl="0">
         <a:lnSpc>
           <a:spcPct val="100000"/>
         </a:lnSpc>
@@ -5279,7 +5410,7 @@
           <a:srgbClr val="000000"/>
         </a:buClr>
         <a:buFont typeface="Arial"/>
-        <a:defRPr b="0" i="0" sz="1400" u="none" cap="none" strike="noStrike">
+        <a:defRPr sz="1400" b="0" i="0" u="none" strike="noStrike" cap="none">
           <a:solidFill>
             <a:srgbClr val="000000"/>
           </a:solidFill>
@@ -5289,7 +5420,7 @@
           <a:sym typeface="Arial"/>
         </a:defRPr>
       </a:lvl4pPr>
-      <a:lvl5pPr lvl="4" marR="0" rtl="0" algn="l">
+      <a:lvl5pPr marR="0" lvl="4" algn="l" rtl="0">
         <a:lnSpc>
           <a:spcPct val="100000"/>
         </a:lnSpc>
@@ -5303,7 +5434,7 @@
           <a:srgbClr val="000000"/>
         </a:buClr>
         <a:buFont typeface="Arial"/>
-        <a:defRPr b="0" i="0" sz="1400" u="none" cap="none" strike="noStrike">
+        <a:defRPr sz="1400" b="0" i="0" u="none" strike="noStrike" cap="none">
           <a:solidFill>
             <a:srgbClr val="000000"/>
           </a:solidFill>
@@ -5313,7 +5444,7 @@
           <a:sym typeface="Arial"/>
         </a:defRPr>
       </a:lvl5pPr>
-      <a:lvl6pPr lvl="5" marR="0" rtl="0" algn="l">
+      <a:lvl6pPr marR="0" lvl="5" algn="l" rtl="0">
         <a:lnSpc>
           <a:spcPct val="100000"/>
         </a:lnSpc>
@@ -5327,7 +5458,7 @@
           <a:srgbClr val="000000"/>
         </a:buClr>
         <a:buFont typeface="Arial"/>
-        <a:defRPr b="0" i="0" sz="1400" u="none" cap="none" strike="noStrike">
+        <a:defRPr sz="1400" b="0" i="0" u="none" strike="noStrike" cap="none">
           <a:solidFill>
             <a:srgbClr val="000000"/>
           </a:solidFill>
@@ -5337,7 +5468,7 @@
           <a:sym typeface="Arial"/>
         </a:defRPr>
       </a:lvl6pPr>
-      <a:lvl7pPr lvl="6" marR="0" rtl="0" algn="l">
+      <a:lvl7pPr marR="0" lvl="6" algn="l" rtl="0">
         <a:lnSpc>
           <a:spcPct val="100000"/>
         </a:lnSpc>
@@ -5351,7 +5482,7 @@
           <a:srgbClr val="000000"/>
         </a:buClr>
         <a:buFont typeface="Arial"/>
-        <a:defRPr b="0" i="0" sz="1400" u="none" cap="none" strike="noStrike">
+        <a:defRPr sz="1400" b="0" i="0" u="none" strike="noStrike" cap="none">
           <a:solidFill>
             <a:srgbClr val="000000"/>
           </a:solidFill>
@@ -5361,7 +5492,7 @@
           <a:sym typeface="Arial"/>
         </a:defRPr>
       </a:lvl7pPr>
-      <a:lvl8pPr lvl="7" marR="0" rtl="0" algn="l">
+      <a:lvl8pPr marR="0" lvl="7" algn="l" rtl="0">
         <a:lnSpc>
           <a:spcPct val="100000"/>
         </a:lnSpc>
@@ -5375,7 +5506,7 @@
           <a:srgbClr val="000000"/>
         </a:buClr>
         <a:buFont typeface="Arial"/>
-        <a:defRPr b="0" i="0" sz="1400" u="none" cap="none" strike="noStrike">
+        <a:defRPr sz="1400" b="0" i="0" u="none" strike="noStrike" cap="none">
           <a:solidFill>
             <a:srgbClr val="000000"/>
           </a:solidFill>
@@ -5385,7 +5516,7 @@
           <a:sym typeface="Arial"/>
         </a:defRPr>
       </a:lvl8pPr>
-      <a:lvl9pPr lvl="8" marR="0" rtl="0" algn="l">
+      <a:lvl9pPr marR="0" lvl="8" algn="l" rtl="0">
         <a:lnSpc>
           <a:spcPct val="100000"/>
         </a:lnSpc>
@@ -5399,7 +5530,7 @@
           <a:srgbClr val="000000"/>
         </a:buClr>
         <a:buFont typeface="Arial"/>
-        <a:defRPr b="0" i="0" sz="1400" u="none" cap="none" strike="noStrike">
+        <a:defRPr sz="1400" b="0" i="0" u="none" strike="noStrike" cap="none">
           <a:solidFill>
             <a:srgbClr val="000000"/>
           </a:solidFill>
@@ -5411,7 +5542,7 @@
       </a:lvl9pPr>
     </p:bodyStyle>
     <p:otherStyle>
-      <a:defPPr lvl="0" marR="0" rtl="0" algn="l">
+      <a:defPPr marR="0" lvl="0" algn="l" rtl="0">
         <a:lnSpc>
           <a:spcPct val="100000"/>
         </a:lnSpc>
@@ -5422,7 +5553,7 @@
           <a:spcPts val="0"/>
         </a:spcAft>
       </a:defPPr>
-      <a:lvl1pPr lvl="0" marR="0" rtl="0" algn="l">
+      <a:lvl1pPr marR="0" lvl="0" algn="l" rtl="0">
         <a:lnSpc>
           <a:spcPct val="100000"/>
         </a:lnSpc>
@@ -5436,7 +5567,7 @@
           <a:srgbClr val="000000"/>
         </a:buClr>
         <a:buFont typeface="Arial"/>
-        <a:defRPr b="0" i="0" sz="1400" u="none" cap="none" strike="noStrike">
+        <a:defRPr sz="1400" b="0" i="0" u="none" strike="noStrike" cap="none">
           <a:solidFill>
             <a:srgbClr val="000000"/>
           </a:solidFill>
@@ -5446,7 +5577,7 @@
           <a:sym typeface="Arial"/>
         </a:defRPr>
       </a:lvl1pPr>
-      <a:lvl2pPr lvl="1" marR="0" rtl="0" algn="l">
+      <a:lvl2pPr marR="0" lvl="1" algn="l" rtl="0">
         <a:lnSpc>
           <a:spcPct val="100000"/>
         </a:lnSpc>
@@ -5460,7 +5591,7 @@
           <a:srgbClr val="000000"/>
         </a:buClr>
         <a:buFont typeface="Arial"/>
-        <a:defRPr b="0" i="0" sz="1400" u="none" cap="none" strike="noStrike">
+        <a:defRPr sz="1400" b="0" i="0" u="none" strike="noStrike" cap="none">
           <a:solidFill>
             <a:srgbClr val="000000"/>
           </a:solidFill>
@@ -5470,7 +5601,7 @@
           <a:sym typeface="Arial"/>
         </a:defRPr>
       </a:lvl2pPr>
-      <a:lvl3pPr lvl="2" marR="0" rtl="0" algn="l">
+      <a:lvl3pPr marR="0" lvl="2" algn="l" rtl="0">
         <a:lnSpc>
           <a:spcPct val="100000"/>
         </a:lnSpc>
@@ -5484,7 +5615,7 @@
           <a:srgbClr val="000000"/>
         </a:buClr>
         <a:buFont typeface="Arial"/>
-        <a:defRPr b="0" i="0" sz="1400" u="none" cap="none" strike="noStrike">
+        <a:defRPr sz="1400" b="0" i="0" u="none" strike="noStrike" cap="none">
           <a:solidFill>
             <a:srgbClr val="000000"/>
           </a:solidFill>
@@ -5494,7 +5625,7 @@
           <a:sym typeface="Arial"/>
         </a:defRPr>
       </a:lvl3pPr>
-      <a:lvl4pPr lvl="3" marR="0" rtl="0" algn="l">
+      <a:lvl4pPr marR="0" lvl="3" algn="l" rtl="0">
         <a:lnSpc>
           <a:spcPct val="100000"/>
         </a:lnSpc>
@@ -5508,7 +5639,7 @@
           <a:srgbClr val="000000"/>
         </a:buClr>
         <a:buFont typeface="Arial"/>
-        <a:defRPr b="0" i="0" sz="1400" u="none" cap="none" strike="noStrike">
+        <a:defRPr sz="1400" b="0" i="0" u="none" strike="noStrike" cap="none">
           <a:solidFill>
             <a:srgbClr val="000000"/>
           </a:solidFill>
@@ -5518,7 +5649,7 @@
           <a:sym typeface="Arial"/>
         </a:defRPr>
       </a:lvl4pPr>
-      <a:lvl5pPr lvl="4" marR="0" rtl="0" algn="l">
+      <a:lvl5pPr marR="0" lvl="4" algn="l" rtl="0">
         <a:lnSpc>
           <a:spcPct val="100000"/>
         </a:lnSpc>
@@ -5532,7 +5663,7 @@
           <a:srgbClr val="000000"/>
         </a:buClr>
         <a:buFont typeface="Arial"/>
-        <a:defRPr b="0" i="0" sz="1400" u="none" cap="none" strike="noStrike">
+        <a:defRPr sz="1400" b="0" i="0" u="none" strike="noStrike" cap="none">
           <a:solidFill>
             <a:srgbClr val="000000"/>
           </a:solidFill>
@@ -5542,7 +5673,7 @@
           <a:sym typeface="Arial"/>
         </a:defRPr>
       </a:lvl5pPr>
-      <a:lvl6pPr lvl="5" marR="0" rtl="0" algn="l">
+      <a:lvl6pPr marR="0" lvl="5" algn="l" rtl="0">
         <a:lnSpc>
           <a:spcPct val="100000"/>
         </a:lnSpc>
@@ -5556,7 +5687,7 @@
           <a:srgbClr val="000000"/>
         </a:buClr>
         <a:buFont typeface="Arial"/>
-        <a:defRPr b="0" i="0" sz="1400" u="none" cap="none" strike="noStrike">
+        <a:defRPr sz="1400" b="0" i="0" u="none" strike="noStrike" cap="none">
           <a:solidFill>
             <a:srgbClr val="000000"/>
           </a:solidFill>
@@ -5566,7 +5697,7 @@
           <a:sym typeface="Arial"/>
         </a:defRPr>
       </a:lvl6pPr>
-      <a:lvl7pPr lvl="6" marR="0" rtl="0" algn="l">
+      <a:lvl7pPr marR="0" lvl="6" algn="l" rtl="0">
         <a:lnSpc>
           <a:spcPct val="100000"/>
         </a:lnSpc>
@@ -5580,7 +5711,7 @@
           <a:srgbClr val="000000"/>
         </a:buClr>
         <a:buFont typeface="Arial"/>
-        <a:defRPr b="0" i="0" sz="1400" u="none" cap="none" strike="noStrike">
+        <a:defRPr sz="1400" b="0" i="0" u="none" strike="noStrike" cap="none">
           <a:solidFill>
             <a:srgbClr val="000000"/>
           </a:solidFill>
@@ -5590,7 +5721,7 @@
           <a:sym typeface="Arial"/>
         </a:defRPr>
       </a:lvl7pPr>
-      <a:lvl8pPr lvl="7" marR="0" rtl="0" algn="l">
+      <a:lvl8pPr marR="0" lvl="7" algn="l" rtl="0">
         <a:lnSpc>
           <a:spcPct val="100000"/>
         </a:lnSpc>
@@ -5604,7 +5735,7 @@
           <a:srgbClr val="000000"/>
         </a:buClr>
         <a:buFont typeface="Arial"/>
-        <a:defRPr b="0" i="0" sz="1400" u="none" cap="none" strike="noStrike">
+        <a:defRPr sz="1400" b="0" i="0" u="none" strike="noStrike" cap="none">
           <a:solidFill>
             <a:srgbClr val="000000"/>
           </a:solidFill>
@@ -5614,7 +5745,7 @@
           <a:sym typeface="Arial"/>
         </a:defRPr>
       </a:lvl8pPr>
-      <a:lvl9pPr lvl="8" marR="0" rtl="0" algn="l">
+      <a:lvl9pPr marR="0" lvl="8" algn="l" rtl="0">
         <a:lnSpc>
           <a:spcPct val="100000"/>
         </a:lnSpc>
@@ -5628,7 +5759,7 @@
           <a:srgbClr val="000000"/>
         </a:buClr>
         <a:buFont typeface="Arial"/>
-        <a:defRPr b="0" i="0" sz="1400" u="none" cap="none" strike="noStrike">
+        <a:defRPr sz="1400" b="0" i="0" u="none" strike="noStrike" cap="none">
           <a:solidFill>
             <a:srgbClr val="000000"/>
           </a:solidFill>
@@ -5644,11 +5775,11 @@
 </file>
 
 <file path=ppt/slides/slide1.xml><?xml version="1.0" encoding="utf-8"?>
-<p:sld xmlns:a="http://schemas.openxmlformats.org/drawingml/2006/main" xmlns:r="http://schemas.openxmlformats.org/officeDocument/2006/relationships" xmlns:mc="http://schemas.openxmlformats.org/markup-compatibility/2006" xmlns:mv="urn:schemas-microsoft-com:mac:vml" xmlns:p="http://schemas.openxmlformats.org/presentationml/2006/main" xmlns:c="http://schemas.openxmlformats.org/drawingml/2006/chart" xmlns:dgm="http://schemas.openxmlformats.org/drawingml/2006/diagram" xmlns:o="urn:schemas-microsoft-com:office:office" xmlns:v="urn:schemas-microsoft-com:vml" xmlns:pvml="urn:schemas-microsoft-com:office:powerpoint" xmlns:com="http://schemas.openxmlformats.org/drawingml/2006/compatibility" xmlns:p14="http://schemas.microsoft.com/office/powerpoint/2010/main" xmlns:p15="http://schemas.microsoft.com/office/powerpoint/2012/main" xmlns:ahyp="http://schemas.microsoft.com/office/drawing/2018/hyperlinkcolor">
+<p:sld xmlns:a="http://schemas.openxmlformats.org/drawingml/2006/main" xmlns:r="http://schemas.openxmlformats.org/officeDocument/2006/relationships" xmlns:p="http://schemas.openxmlformats.org/presentationml/2006/main">
   <p:cSld>
     <p:spTree>
       <p:nvGrpSpPr>
-        <p:cNvPr id="53" name="Shape 53"/>
+        <p:cNvPr id="1" name="Shape 53"/>
         <p:cNvGrpSpPr/>
         <p:nvPr/>
       </p:nvGrpSpPr>
@@ -5663,7 +5794,9 @@
       <p:sp>
         <p:nvSpPr>
           <p:cNvPr id="54" name="Google Shape;54;p13"/>
-          <p:cNvSpPr txBox="1"/>
+          <p:cNvSpPr txBox="1">
+            <a:spLocks noGrp="1"/>
+          </p:cNvSpPr>
           <p:nvPr>
             <p:ph type="ctrTitle"/>
           </p:nvPr>
@@ -5678,12 +5811,12 @@
           </a:prstGeom>
         </p:spPr>
         <p:txBody>
-          <a:bodyPr anchorCtr="0" anchor="b" bIns="91425" lIns="91425" spcFirstLastPara="1" rIns="91425" wrap="square" tIns="91425">
+          <a:bodyPr spcFirstLastPara="1" wrap="square" lIns="91425" tIns="91425" rIns="91425" bIns="91425" anchor="b" anchorCtr="0">
             <a:normAutofit/>
           </a:bodyPr>
           <a:lstStyle/>
           <a:p>
-            <a:pPr indent="0" lvl="0" marL="0" rtl="0" algn="ctr">
+            <a:pPr marL="0" lvl="0" indent="0" algn="ctr" rtl="0">
               <a:spcBef>
                 <a:spcPts val="0"/>
               </a:spcBef>
@@ -5703,9 +5836,11 @@
       <p:sp>
         <p:nvSpPr>
           <p:cNvPr id="55" name="Google Shape;55;p13"/>
-          <p:cNvSpPr txBox="1"/>
+          <p:cNvSpPr txBox="1">
+            <a:spLocks noGrp="1"/>
+          </p:cNvSpPr>
           <p:nvPr>
-            <p:ph idx="1" type="subTitle"/>
+            <p:ph type="subTitle" idx="1"/>
           </p:nvPr>
         </p:nvSpPr>
         <p:spPr>
@@ -5718,12 +5853,12 @@
           </a:prstGeom>
         </p:spPr>
         <p:txBody>
-          <a:bodyPr anchorCtr="0" anchor="t" bIns="91425" lIns="91425" spcFirstLastPara="1" rIns="91425" wrap="square" tIns="91425">
+          <a:bodyPr spcFirstLastPara="1" wrap="square" lIns="91425" tIns="91425" rIns="91425" bIns="91425" anchor="t" anchorCtr="0">
             <a:normAutofit/>
           </a:bodyPr>
           <a:lstStyle/>
           <a:p>
-            <a:pPr indent="0" lvl="0" marL="0" rtl="0" algn="ctr">
+            <a:pPr marL="0" lvl="0" indent="0" algn="ctr" rtl="0">
               <a:spcBef>
                 <a:spcPts val="0"/>
               </a:spcBef>
@@ -5732,9 +5867,6 @@
               </a:spcAft>
               <a:buNone/>
             </a:pPr>
-            <a:r>
-              <a:t/>
-            </a:r>
             <a:endParaRPr/>
           </a:p>
         </p:txBody>
@@ -5748,11 +5880,11 @@
 </file>
 
 <file path=ppt/slides/slide2.xml><?xml version="1.0" encoding="utf-8"?>
-<p:sld xmlns:a="http://schemas.openxmlformats.org/drawingml/2006/main" xmlns:r="http://schemas.openxmlformats.org/officeDocument/2006/relationships" xmlns:mc="http://schemas.openxmlformats.org/markup-compatibility/2006" xmlns:mv="urn:schemas-microsoft-com:mac:vml" xmlns:p="http://schemas.openxmlformats.org/presentationml/2006/main" xmlns:c="http://schemas.openxmlformats.org/drawingml/2006/chart" xmlns:dgm="http://schemas.openxmlformats.org/drawingml/2006/diagram" xmlns:o="urn:schemas-microsoft-com:office:office" xmlns:v="urn:schemas-microsoft-com:vml" xmlns:pvml="urn:schemas-microsoft-com:office:powerpoint" xmlns:com="http://schemas.openxmlformats.org/drawingml/2006/compatibility" xmlns:p14="http://schemas.microsoft.com/office/powerpoint/2010/main" xmlns:p15="http://schemas.microsoft.com/office/powerpoint/2012/main" xmlns:ahyp="http://schemas.microsoft.com/office/drawing/2018/hyperlinkcolor">
+<p:sld xmlns:a="http://schemas.openxmlformats.org/drawingml/2006/main" xmlns:r="http://schemas.openxmlformats.org/officeDocument/2006/relationships" xmlns:p="http://schemas.openxmlformats.org/presentationml/2006/main">
   <p:cSld>
     <p:spTree>
       <p:nvGrpSpPr>
-        <p:cNvPr id="59" name="Shape 59"/>
+        <p:cNvPr id="1" name="Shape 59"/>
         <p:cNvGrpSpPr/>
         <p:nvPr/>
       </p:nvGrpSpPr>
@@ -5767,7 +5899,9 @@
       <p:sp>
         <p:nvSpPr>
           <p:cNvPr id="60" name="Google Shape;60;p14"/>
-          <p:cNvSpPr txBox="1"/>
+          <p:cNvSpPr txBox="1">
+            <a:spLocks noGrp="1"/>
+          </p:cNvSpPr>
           <p:nvPr>
             <p:ph type="title"/>
           </p:nvPr>
@@ -5782,12 +5916,12 @@
           </a:prstGeom>
         </p:spPr>
         <p:txBody>
-          <a:bodyPr anchorCtr="0" anchor="t" bIns="91425" lIns="91425" spcFirstLastPara="1" rIns="91425" wrap="square" tIns="91425">
+          <a:bodyPr spcFirstLastPara="1" wrap="square" lIns="91425" tIns="91425" rIns="91425" bIns="91425" anchor="t" anchorCtr="0">
             <a:normAutofit fontScale="90000"/>
           </a:bodyPr>
           <a:lstStyle/>
           <a:p>
-            <a:pPr indent="0" lvl="0" marL="0" rtl="0" algn="l">
+            <a:pPr marL="0" lvl="0" indent="0" algn="l" rtl="0">
               <a:spcBef>
                 <a:spcPts val="0"/>
               </a:spcBef>
@@ -5796,9 +5930,6 @@
               </a:spcAft>
               <a:buNone/>
             </a:pPr>
-            <a:r>
-              <a:t/>
-            </a:r>
             <a:endParaRPr/>
           </a:p>
         </p:txBody>
@@ -5806,9 +5937,11 @@
       <p:sp>
         <p:nvSpPr>
           <p:cNvPr id="61" name="Google Shape;61;p14"/>
-          <p:cNvSpPr txBox="1"/>
+          <p:cNvSpPr txBox="1">
+            <a:spLocks noGrp="1"/>
+          </p:cNvSpPr>
           <p:nvPr>
-            <p:ph idx="1" type="body"/>
+            <p:ph type="body" idx="1"/>
           </p:nvPr>
         </p:nvSpPr>
         <p:spPr>
@@ -5821,12 +5954,12 @@
           </a:prstGeom>
         </p:spPr>
         <p:txBody>
-          <a:bodyPr anchorCtr="0" anchor="t" bIns="91425" lIns="91425" spcFirstLastPara="1" rIns="91425" wrap="square" tIns="91425">
+          <a:bodyPr spcFirstLastPara="1" wrap="square" lIns="91425" tIns="91425" rIns="91425" bIns="91425" anchor="t" anchorCtr="0">
             <a:normAutofit fontScale="62500" lnSpcReduction="20000"/>
           </a:bodyPr>
           <a:lstStyle/>
           <a:p>
-            <a:pPr indent="0" lvl="0" marL="0" rtl="0" algn="l">
+            <a:pPr marL="0" lvl="0" indent="0" algn="l" rtl="0">
               <a:lnSpc>
                 <a:spcPct val="150000"/>
               </a:lnSpc>
@@ -5872,7 +6005,7 @@
             </a:endParaRPr>
           </a:p>
           <a:p>
-            <a:pPr indent="0" lvl="0" marL="0" rtl="0" algn="l">
+            <a:pPr marL="0" lvl="0" indent="0" algn="l" rtl="0">
               <a:spcBef>
                 <a:spcPts val="900"/>
               </a:spcBef>
@@ -5915,7 +6048,7 @@
             </a:endParaRPr>
           </a:p>
           <a:p>
-            <a:pPr indent="-276225" lvl="0" marL="698500" rtl="0" algn="l">
+            <a:pPr marL="698500" lvl="0" indent="-276225" algn="l" rtl="0">
               <a:spcBef>
                 <a:spcPts val="900"/>
               </a:spcBef>
@@ -5958,7 +6091,7 @@
             </a:endParaRPr>
           </a:p>
           <a:p>
-            <a:pPr indent="-276225" lvl="0" marL="698500" rtl="0" algn="l">
+            <a:pPr marL="698500" lvl="0" indent="-276225" algn="l" rtl="0">
               <a:spcBef>
                 <a:spcPts val="0"/>
               </a:spcBef>
@@ -6001,7 +6134,7 @@
             </a:endParaRPr>
           </a:p>
           <a:p>
-            <a:pPr indent="-276225" lvl="0" marL="698500" rtl="0" algn="l">
+            <a:pPr marL="698500" lvl="0" indent="-276225" algn="l" rtl="0">
               <a:spcBef>
                 <a:spcPts val="0"/>
               </a:spcBef>
@@ -6044,7 +6177,7 @@
             </a:endParaRPr>
           </a:p>
           <a:p>
-            <a:pPr indent="-276225" lvl="0" marL="698500" rtl="0" algn="l">
+            <a:pPr marL="698500" lvl="0" indent="-276225" algn="l" rtl="0">
               <a:spcBef>
                 <a:spcPts val="0"/>
               </a:spcBef>
@@ -6087,7 +6220,7 @@
             </a:endParaRPr>
           </a:p>
           <a:p>
-            <a:pPr indent="-276225" lvl="0" marL="698500" rtl="0" algn="l">
+            <a:pPr marL="698500" lvl="0" indent="-276225" algn="l" rtl="0">
               <a:spcBef>
                 <a:spcPts val="0"/>
               </a:spcBef>
@@ -6130,7 +6263,7 @@
             </a:endParaRPr>
           </a:p>
           <a:p>
-            <a:pPr indent="-276225" lvl="0" marL="698500" rtl="0" algn="l">
+            <a:pPr marL="698500" lvl="0" indent="-276225" algn="l" rtl="0">
               <a:spcBef>
                 <a:spcPts val="0"/>
               </a:spcBef>
@@ -6173,7 +6306,7 @@
             </a:endParaRPr>
           </a:p>
           <a:p>
-            <a:pPr indent="0" lvl="0" marL="0" rtl="0" algn="l">
+            <a:pPr marL="0" lvl="0" indent="0" algn="l" rtl="0">
               <a:spcBef>
                 <a:spcPts val="1000"/>
               </a:spcBef>
@@ -6216,7 +6349,7 @@
             </a:endParaRPr>
           </a:p>
           <a:p>
-            <a:pPr indent="0" lvl="0" marL="0" rtl="0" algn="l">
+            <a:pPr marL="0" lvl="0" indent="0" algn="l" rtl="0">
               <a:spcBef>
                 <a:spcPts val="900"/>
               </a:spcBef>
@@ -6246,7 +6379,7 @@
               <a:t>We will need to go rather quick through the team presentations, so your team must practice and be sure that your presentation takes no more than 6 minutes. With questions and team turnaround, we can get through all teams in a lab period. </a:t>
             </a:r>
             <a:r>
-              <a:rPr b="1" lang="en" sz="1200">
+              <a:rPr lang="en" sz="1200" b="1">
                 <a:solidFill>
                   <a:srgbClr val="2D3B45"/>
                 </a:solidFill>
@@ -6260,7 +6393,7 @@
               </a:rPr>
               <a:t>We will run the presentations off of the professor's stream, so submitting your PDF is an absolute must. </a:t>
             </a:r>
-            <a:endParaRPr b="1" sz="1200">
+            <a:endParaRPr sz="1200" b="1">
               <a:solidFill>
                 <a:srgbClr val="2D3B45"/>
               </a:solidFill>
@@ -6274,7 +6407,7 @@
             </a:endParaRPr>
           </a:p>
           <a:p>
-            <a:pPr indent="0" lvl="0" marL="0" rtl="0" algn="l">
+            <a:pPr marL="0" lvl="0" indent="0" algn="l" rtl="0">
               <a:spcBef>
                 <a:spcPts val="900"/>
               </a:spcBef>
@@ -6317,7 +6450,7 @@
             </a:endParaRPr>
           </a:p>
           <a:p>
-            <a:pPr indent="0" lvl="0" marL="0" rtl="0" algn="l">
+            <a:pPr marL="0" lvl="0" indent="0" algn="l" rtl="0">
               <a:spcBef>
                 <a:spcPts val="900"/>
               </a:spcBef>
@@ -6360,7 +6493,7 @@
             </a:endParaRPr>
           </a:p>
           <a:p>
-            <a:pPr indent="-276225" lvl="0" marL="698500" rtl="0" algn="l">
+            <a:pPr marL="698500" lvl="0" indent="-276225" algn="l" rtl="0">
               <a:spcBef>
                 <a:spcPts val="900"/>
               </a:spcBef>
@@ -6403,7 +6536,7 @@
             </a:endParaRPr>
           </a:p>
           <a:p>
-            <a:pPr indent="0" lvl="0" marL="0" rtl="0" algn="l">
+            <a:pPr marL="0" lvl="0" indent="0" algn="l" rtl="0">
               <a:spcBef>
                 <a:spcPts val="1000"/>
               </a:spcBef>
@@ -6412,9 +6545,6 @@
               </a:spcAft>
               <a:buNone/>
             </a:pPr>
-            <a:r>
-              <a:t/>
-            </a:r>
             <a:endParaRPr/>
           </a:p>
         </p:txBody>
@@ -6428,11 +6558,11 @@
 </file>
 
 <file path=ppt/slides/slide3.xml><?xml version="1.0" encoding="utf-8"?>
-<p:sld xmlns:a="http://schemas.openxmlformats.org/drawingml/2006/main" xmlns:r="http://schemas.openxmlformats.org/officeDocument/2006/relationships" xmlns:mc="http://schemas.openxmlformats.org/markup-compatibility/2006" xmlns:mv="urn:schemas-microsoft-com:mac:vml" xmlns:p="http://schemas.openxmlformats.org/presentationml/2006/main" xmlns:c="http://schemas.openxmlformats.org/drawingml/2006/chart" xmlns:dgm="http://schemas.openxmlformats.org/drawingml/2006/diagram" xmlns:o="urn:schemas-microsoft-com:office:office" xmlns:v="urn:schemas-microsoft-com:vml" xmlns:pvml="urn:schemas-microsoft-com:office:powerpoint" xmlns:com="http://schemas.openxmlformats.org/drawingml/2006/compatibility" xmlns:p14="http://schemas.microsoft.com/office/powerpoint/2010/main" xmlns:p15="http://schemas.microsoft.com/office/powerpoint/2012/main" xmlns:ahyp="http://schemas.microsoft.com/office/drawing/2018/hyperlinkcolor">
+<p:sld xmlns:a="http://schemas.openxmlformats.org/drawingml/2006/main" xmlns:r="http://schemas.openxmlformats.org/officeDocument/2006/relationships" xmlns:p="http://schemas.openxmlformats.org/presentationml/2006/main">
   <p:cSld>
     <p:spTree>
       <p:nvGrpSpPr>
-        <p:cNvPr id="65" name="Shape 65"/>
+        <p:cNvPr id="1" name="Shape 65"/>
         <p:cNvGrpSpPr/>
         <p:nvPr/>
       </p:nvGrpSpPr>
@@ -6447,7 +6577,9 @@
       <p:sp>
         <p:nvSpPr>
           <p:cNvPr id="66" name="Google Shape;66;p15"/>
-          <p:cNvSpPr txBox="1"/>
+          <p:cNvSpPr txBox="1">
+            <a:spLocks noGrp="1"/>
+          </p:cNvSpPr>
           <p:nvPr>
             <p:ph type="title"/>
           </p:nvPr>
@@ -6462,12 +6594,12 @@
           </a:prstGeom>
         </p:spPr>
         <p:txBody>
-          <a:bodyPr anchorCtr="0" anchor="t" bIns="91425" lIns="91425" spcFirstLastPara="1" rIns="91425" wrap="square" tIns="91425">
+          <a:bodyPr spcFirstLastPara="1" wrap="square" lIns="91425" tIns="91425" rIns="91425" bIns="91425" anchor="t" anchorCtr="0">
             <a:normAutofit fontScale="90000"/>
           </a:bodyPr>
           <a:lstStyle/>
           <a:p>
-            <a:pPr indent="0" lvl="0" marL="0" rtl="0" algn="l">
+            <a:pPr marL="0" lvl="0" indent="0" algn="l" rtl="0">
               <a:spcBef>
                 <a:spcPts val="0"/>
               </a:spcBef>
@@ -6477,19 +6609,21 @@
               <a:buNone/>
             </a:pPr>
             <a:r>
-              <a:rPr lang="en"/>
+              <a:rPr lang="en" dirty="0"/>
               <a:t>Architecture diagram</a:t>
             </a:r>
-            <a:endParaRPr/>
+            <a:endParaRPr dirty="0"/>
           </a:p>
         </p:txBody>
       </p:sp>
       <p:sp>
         <p:nvSpPr>
           <p:cNvPr id="67" name="Google Shape;67;p15"/>
-          <p:cNvSpPr txBox="1"/>
+          <p:cNvSpPr txBox="1">
+            <a:spLocks noGrp="1"/>
+          </p:cNvSpPr>
           <p:nvPr>
-            <p:ph idx="1" type="body"/>
+            <p:ph type="body" idx="1"/>
           </p:nvPr>
         </p:nvSpPr>
         <p:spPr>
@@ -6502,12 +6636,12 @@
           </a:prstGeom>
         </p:spPr>
         <p:txBody>
-          <a:bodyPr anchorCtr="0" anchor="t" bIns="91425" lIns="91425" spcFirstLastPara="1" rIns="91425" wrap="square" tIns="91425">
+          <a:bodyPr spcFirstLastPara="1" wrap="square" lIns="91425" tIns="91425" rIns="91425" bIns="91425" anchor="t" anchorCtr="0">
             <a:normAutofit/>
           </a:bodyPr>
           <a:lstStyle/>
           <a:p>
-            <a:pPr indent="0" lvl="0" marL="0" rtl="0" algn="l">
+            <a:pPr marL="0" lvl="0" indent="0" algn="l" rtl="0">
               <a:spcBef>
                 <a:spcPts val="0"/>
               </a:spcBef>
@@ -6517,9 +6651,80 @@
               <a:buNone/>
             </a:pPr>
             <a:r>
-              <a:t/>
+              <a:rPr lang="en-US" dirty="0"/>
+              <a:t>Pipelining</a:t>
             </a:r>
-            <a:endParaRPr/>
+          </a:p>
+          <a:p>
+            <a:pPr marL="0" lvl="0" indent="0" algn="l" rtl="0">
+              <a:spcBef>
+                <a:spcPts val="0"/>
+              </a:spcBef>
+              <a:spcAft>
+                <a:spcPts val="1200"/>
+              </a:spcAft>
+              <a:buNone/>
+            </a:pPr>
+            <a:r>
+              <a:rPr lang="en-US" dirty="0"/>
+              <a:t>Why:</a:t>
+            </a:r>
+          </a:p>
+          <a:p>
+            <a:pPr marL="285750" indent="-285750">
+              <a:spcAft>
+                <a:spcPts val="1200"/>
+              </a:spcAft>
+            </a:pPr>
+            <a:r>
+              <a:rPr lang="en-US" dirty="0"/>
+              <a:t>	Needs to be cyclical/continuous</a:t>
+            </a:r>
+          </a:p>
+          <a:p>
+            <a:pPr marL="285750" indent="-285750">
+              <a:spcAft>
+                <a:spcPts val="1200"/>
+              </a:spcAft>
+            </a:pPr>
+            <a:r>
+              <a:rPr lang="en-US" dirty="0"/>
+              <a:t>	show if/then relationships</a:t>
+            </a:r>
+          </a:p>
+          <a:p>
+            <a:pPr marL="285750" indent="-285750">
+              <a:spcAft>
+                <a:spcPts val="1200"/>
+              </a:spcAft>
+            </a:pPr>
+            <a:r>
+              <a:rPr lang="en-US" dirty="0"/>
+              <a:t>	easy to design</a:t>
+            </a:r>
+          </a:p>
+          <a:p>
+            <a:pPr marL="285750" indent="-285750">
+              <a:spcAft>
+                <a:spcPts val="1200"/>
+              </a:spcAft>
+            </a:pPr>
+            <a:r>
+              <a:rPr lang="en-US" dirty="0"/>
+              <a:t>	updatable in design b/c this is unchartered territory</a:t>
+            </a:r>
+          </a:p>
+          <a:p>
+            <a:pPr marL="0" lvl="0" indent="0" algn="l" rtl="0">
+              <a:spcBef>
+                <a:spcPts val="0"/>
+              </a:spcBef>
+              <a:spcAft>
+                <a:spcPts val="1200"/>
+              </a:spcAft>
+              <a:buNone/>
+            </a:pPr>
+            <a:endParaRPr dirty="0"/>
           </a:p>
         </p:txBody>
       </p:sp>
@@ -6531,8 +6736,226 @@
 </p:sld>
 </file>
 
+<file path=ppt/slides/slide4.xml><?xml version="1.0" encoding="utf-8"?>
+<p:sld xmlns:a="http://schemas.openxmlformats.org/drawingml/2006/main" xmlns:r="http://schemas.openxmlformats.org/officeDocument/2006/relationships" xmlns:p="http://schemas.openxmlformats.org/presentationml/2006/main">
+  <p:cSld>
+    <p:spTree>
+      <p:nvGrpSpPr>
+        <p:cNvPr id="1" name=""/>
+        <p:cNvGrpSpPr/>
+        <p:nvPr/>
+      </p:nvGrpSpPr>
+      <p:grpSpPr>
+        <a:xfrm>
+          <a:off x="0" y="0"/>
+          <a:ext cx="0" cy="0"/>
+          <a:chOff x="0" y="0"/>
+          <a:chExt cx="0" cy="0"/>
+        </a:xfrm>
+      </p:grpSpPr>
+      <p:sp>
+        <p:nvSpPr>
+          <p:cNvPr id="2" name="Title 1">
+            <a:extLst>
+              <a:ext uri="{FF2B5EF4-FFF2-40B4-BE49-F238E27FC236}">
+                <a16:creationId xmlns:a16="http://schemas.microsoft.com/office/drawing/2014/main" id="{8B325385-D7B5-4EA3-AFA6-E7C4960BD11C}"/>
+              </a:ext>
+            </a:extLst>
+          </p:cNvPr>
+          <p:cNvSpPr>
+            <a:spLocks noGrp="1"/>
+          </p:cNvSpPr>
+          <p:nvPr>
+            <p:ph type="title"/>
+          </p:nvPr>
+        </p:nvSpPr>
+        <p:spPr/>
+        <p:txBody>
+          <a:bodyPr>
+            <a:normAutofit fontScale="90000"/>
+          </a:bodyPr>
+          <a:lstStyle/>
+          <a:p>
+            <a:r>
+              <a:rPr lang="en" dirty="0"/>
+              <a:t>Architecture diagram</a:t>
+            </a:r>
+            <a:endParaRPr lang="en-US" dirty="0"/>
+          </a:p>
+        </p:txBody>
+      </p:sp>
+      <p:sp>
+        <p:nvSpPr>
+          <p:cNvPr id="3" name="Text Placeholder 2">
+            <a:extLst>
+              <a:ext uri="{FF2B5EF4-FFF2-40B4-BE49-F238E27FC236}">
+                <a16:creationId xmlns:a16="http://schemas.microsoft.com/office/drawing/2014/main" id="{E4D70590-4C25-4889-8733-F693A1BD3507}"/>
+              </a:ext>
+            </a:extLst>
+          </p:cNvPr>
+          <p:cNvSpPr>
+            <a:spLocks noGrp="1"/>
+          </p:cNvSpPr>
+          <p:nvPr>
+            <p:ph type="body" idx="1"/>
+          </p:nvPr>
+        </p:nvSpPr>
+        <p:spPr/>
+        <p:txBody>
+          <a:bodyPr>
+            <a:normAutofit fontScale="47500" lnSpcReduction="20000"/>
+          </a:bodyPr>
+          <a:lstStyle/>
+          <a:p>
+            <a:pPr marL="0" lvl="0" indent="0" algn="l" rtl="0">
+              <a:spcBef>
+                <a:spcPts val="0"/>
+              </a:spcBef>
+              <a:spcAft>
+                <a:spcPts val="1200"/>
+              </a:spcAft>
+              <a:buNone/>
+            </a:pPr>
+            <a:r>
+              <a:rPr lang="en-US" dirty="0"/>
+              <a:t>Peer2Peer:</a:t>
+            </a:r>
+          </a:p>
+          <a:p>
+            <a:pPr marL="0" lvl="0" indent="0" algn="l" rtl="0">
+              <a:spcBef>
+                <a:spcPts val="0"/>
+              </a:spcBef>
+              <a:spcAft>
+                <a:spcPts val="1200"/>
+              </a:spcAft>
+              <a:buNone/>
+            </a:pPr>
+            <a:r>
+              <a:rPr lang="en-US" dirty="0"/>
+              <a:t>Why:</a:t>
+            </a:r>
+          </a:p>
+          <a:p>
+            <a:pPr marL="285750" indent="-285750">
+              <a:spcAft>
+                <a:spcPts val="1200"/>
+              </a:spcAft>
+            </a:pPr>
+            <a:r>
+              <a:rPr lang="en-US" dirty="0"/>
+              <a:t>	easy to use</a:t>
+            </a:r>
+          </a:p>
+          <a:p>
+            <a:pPr marL="285750" indent="-285750">
+              <a:spcAft>
+                <a:spcPts val="1200"/>
+              </a:spcAft>
+            </a:pPr>
+            <a:r>
+              <a:rPr lang="en-US" dirty="0"/>
+              <a:t>	shows continuous relationships</a:t>
+            </a:r>
+          </a:p>
+          <a:p>
+            <a:pPr marL="285750" indent="-285750">
+              <a:spcAft>
+                <a:spcPts val="1200"/>
+              </a:spcAft>
+            </a:pPr>
+            <a:r>
+              <a:rPr lang="en-US" dirty="0"/>
+              <a:t>	shows tiers</a:t>
+            </a:r>
+          </a:p>
+          <a:p>
+            <a:pPr marL="0" lvl="0" indent="0" algn="l" rtl="0">
+              <a:spcBef>
+                <a:spcPts val="0"/>
+              </a:spcBef>
+              <a:spcAft>
+                <a:spcPts val="1200"/>
+              </a:spcAft>
+              <a:buNone/>
+            </a:pPr>
+            <a:r>
+              <a:rPr lang="en-US" dirty="0"/>
+              <a:t>Why not:</a:t>
+            </a:r>
+          </a:p>
+          <a:p>
+            <a:pPr marL="285750" indent="-285750">
+              <a:spcAft>
+                <a:spcPts val="1200"/>
+              </a:spcAft>
+            </a:pPr>
+            <a:r>
+              <a:rPr lang="en-US" dirty="0"/>
+              <a:t>	Doesn’t fully show the flow diagram</a:t>
+            </a:r>
+          </a:p>
+          <a:p>
+            <a:pPr marL="285750" indent="-285750">
+              <a:spcAft>
+                <a:spcPts val="1200"/>
+              </a:spcAft>
+            </a:pPr>
+            <a:r>
+              <a:rPr lang="en-US" dirty="0"/>
+              <a:t>	harder to update</a:t>
+            </a:r>
+          </a:p>
+          <a:p>
+            <a:pPr marL="285750" indent="-285750">
+              <a:spcAft>
+                <a:spcPts val="1200"/>
+              </a:spcAft>
+            </a:pPr>
+            <a:r>
+              <a:rPr lang="en-US" dirty="0"/>
+              <a:t>	less tiers, less descriptive</a:t>
+            </a:r>
+          </a:p>
+          <a:p>
+            <a:pPr marL="285750" indent="-285750">
+              <a:spcAft>
+                <a:spcPts val="1200"/>
+              </a:spcAft>
+            </a:pPr>
+            <a:r>
+              <a:rPr lang="en-US" dirty="0"/>
+              <a:t>	We are not doing file sharing</a:t>
+            </a:r>
+          </a:p>
+          <a:p>
+            <a:pPr marL="285750" indent="-285750">
+              <a:spcAft>
+                <a:spcPts val="1200"/>
+              </a:spcAft>
+            </a:pPr>
+            <a:r>
+              <a:rPr lang="en-US" dirty="0"/>
+              <a:t>	Objects are not requesting things of each other</a:t>
+            </a:r>
+          </a:p>
+        </p:txBody>
+      </p:sp>
+    </p:spTree>
+    <p:extLst>
+      <p:ext uri="{BB962C8B-B14F-4D97-AF65-F5344CB8AC3E}">
+        <p14:creationId xmlns:p14="http://schemas.microsoft.com/office/powerpoint/2010/main" val="3488151986"/>
+      </p:ext>
+    </p:extLst>
+  </p:cSld>
+  <p:clrMapOvr>
+    <a:masterClrMapping/>
+  </p:clrMapOvr>
+</p:sld>
+</file>
+
 <file path=ppt/theme/theme1.xml><?xml version="1.0" encoding="utf-8"?>
-<a:theme xmlns:a="http://schemas.openxmlformats.org/drawingml/2006/main" xmlns:r="http://schemas.openxmlformats.org/officeDocument/2006/relationships" name="Simple Light">
+<a:theme xmlns:a="http://schemas.openxmlformats.org/drawingml/2006/main" name="Simple Light">
   <a:themeElements>
     <a:clrScheme name="Simple Light">
       <a:dk1>
@@ -6807,11 +7230,13 @@
       </a:bgFillStyleLst>
     </a:fmtScheme>
   </a:themeElements>
+  <a:objectDefaults/>
+  <a:extraClrSchemeLst/>
 </a:theme>
 </file>
 
 <file path=ppt/theme/theme2.xml><?xml version="1.0" encoding="utf-8"?>
-<a:theme xmlns:a="http://schemas.openxmlformats.org/drawingml/2006/main" xmlns:r="http://schemas.openxmlformats.org/officeDocument/2006/relationships">
+<a:theme xmlns:a="http://schemas.openxmlformats.org/drawingml/2006/main">
   <a:themeElements>
     <a:clrScheme name="Default">
       <a:dk1>
@@ -7086,5 +7511,7 @@
       </a:bgFillStyleLst>
     </a:fmtScheme>
   </a:themeElements>
+  <a:objectDefaults/>
+  <a:extraClrSchemeLst/>
 </a:theme>
 </file>
</xml_diff>

<commit_message>
Update Notification Central Arch Pres.pptx
</commit_message>
<xml_diff>
--- a/Notification Central Arch Pres.pptx
+++ b/Notification Central Arch Pres.pptx
@@ -5,7 +5,7 @@
     <p:sldMasterId id="2147483659" r:id="rId1"/>
   </p:sldMasterIdLst>
   <p:notesMasterIdLst>
-    <p:notesMasterId r:id="rId9"/>
+    <p:notesMasterId r:id="rId10"/>
   </p:notesMasterIdLst>
   <p:sldIdLst>
     <p:sldId id="256" r:id="rId2"/>
@@ -15,16 +15,17 @@
     <p:sldId id="260" r:id="rId6"/>
     <p:sldId id="261" r:id="rId7"/>
     <p:sldId id="262" r:id="rId8"/>
+    <p:sldId id="263" r:id="rId9"/>
   </p:sldIdLst>
   <p:sldSz cx="9144000" cy="5143500" type="screen16x9"/>
   <p:notesSz cx="6858000" cy="9144000"/>
   <p:embeddedFontLst>
     <p:embeddedFont>
       <p:font typeface="Lato" panose="020B0604020202020204" charset="0"/>
-      <p:regular r:id="rId10"/>
-      <p:bold r:id="rId11"/>
-      <p:italic r:id="rId12"/>
-      <p:boldItalic r:id="rId13"/>
+      <p:regular r:id="rId11"/>
+      <p:bold r:id="rId12"/>
+      <p:italic r:id="rId13"/>
+      <p:boldItalic r:id="rId14"/>
     </p:embeddedFont>
   </p:embeddedFontLst>
   <p:defaultTextStyle>
@@ -7405,6 +7406,121 @@
 </p:sld>
 </file>
 
+<file path=ppt/slides/slide8.xml><?xml version="1.0" encoding="utf-8"?>
+<p:sld xmlns:a="http://schemas.openxmlformats.org/drawingml/2006/main" xmlns:r="http://schemas.openxmlformats.org/officeDocument/2006/relationships" xmlns:p="http://schemas.openxmlformats.org/presentationml/2006/main">
+  <p:cSld>
+    <p:spTree>
+      <p:nvGrpSpPr>
+        <p:cNvPr id="1" name=""/>
+        <p:cNvGrpSpPr/>
+        <p:nvPr/>
+      </p:nvGrpSpPr>
+      <p:grpSpPr>
+        <a:xfrm>
+          <a:off x="0" y="0"/>
+          <a:ext cx="0" cy="0"/>
+          <a:chOff x="0" y="0"/>
+          <a:chExt cx="0" cy="0"/>
+        </a:xfrm>
+      </p:grpSpPr>
+      <p:sp>
+        <p:nvSpPr>
+          <p:cNvPr id="2" name="Title 1">
+            <a:extLst>
+              <a:ext uri="{FF2B5EF4-FFF2-40B4-BE49-F238E27FC236}">
+                <a16:creationId xmlns:a16="http://schemas.microsoft.com/office/drawing/2014/main" id="{EDFED89E-C623-4441-973A-4AA1D7C54825}"/>
+              </a:ext>
+            </a:extLst>
+          </p:cNvPr>
+          <p:cNvSpPr>
+            <a:spLocks noGrp="1"/>
+          </p:cNvSpPr>
+          <p:nvPr>
+            <p:ph type="title"/>
+          </p:nvPr>
+        </p:nvSpPr>
+        <p:spPr/>
+        <p:txBody>
+          <a:bodyPr>
+            <a:normAutofit fontScale="90000"/>
+          </a:bodyPr>
+          <a:lstStyle/>
+          <a:p>
+            <a:r>
+              <a:rPr lang="en-US" dirty="0"/>
+              <a:t>Publish/subscribe</a:t>
+            </a:r>
+          </a:p>
+        </p:txBody>
+      </p:sp>
+      <p:sp>
+        <p:nvSpPr>
+          <p:cNvPr id="3" name="Text Placeholder 2">
+            <a:extLst>
+              <a:ext uri="{FF2B5EF4-FFF2-40B4-BE49-F238E27FC236}">
+                <a16:creationId xmlns:a16="http://schemas.microsoft.com/office/drawing/2014/main" id="{5D7B6E5E-EA9B-47C1-8D9E-802EC9D28792}"/>
+              </a:ext>
+            </a:extLst>
+          </p:cNvPr>
+          <p:cNvSpPr>
+            <a:spLocks noGrp="1"/>
+          </p:cNvSpPr>
+          <p:nvPr>
+            <p:ph type="body" idx="1"/>
+          </p:nvPr>
+        </p:nvSpPr>
+        <p:spPr/>
+        <p:txBody>
+          <a:bodyPr/>
+          <a:lstStyle/>
+          <a:p>
+            <a:endParaRPr lang="en-US"/>
+          </a:p>
+        </p:txBody>
+      </p:sp>
+      <p:pic>
+        <p:nvPicPr>
+          <p:cNvPr id="5" name="Picture 4" descr="A picture containing chart&#10;&#10;Description automatically generated">
+            <a:extLst>
+              <a:ext uri="{FF2B5EF4-FFF2-40B4-BE49-F238E27FC236}">
+                <a16:creationId xmlns:a16="http://schemas.microsoft.com/office/drawing/2014/main" id="{934278FF-0E44-4B03-9A40-17E3163BD5EF}"/>
+              </a:ext>
+            </a:extLst>
+          </p:cNvPr>
+          <p:cNvPicPr>
+            <a:picLocks noChangeAspect="1"/>
+          </p:cNvPicPr>
+          <p:nvPr/>
+        </p:nvPicPr>
+        <p:blipFill>
+          <a:blip r:embed="rId2"/>
+          <a:stretch>
+            <a:fillRect/>
+          </a:stretch>
+        </p:blipFill>
+        <p:spPr>
+          <a:xfrm>
+            <a:off x="444084" y="1212075"/>
+            <a:ext cx="6826601" cy="2089257"/>
+          </a:xfrm>
+          <a:prstGeom prst="rect">
+            <a:avLst/>
+          </a:prstGeom>
+        </p:spPr>
+      </p:pic>
+    </p:spTree>
+    <p:extLst>
+      <p:ext uri="{BB962C8B-B14F-4D97-AF65-F5344CB8AC3E}">
+        <p14:creationId xmlns:p14="http://schemas.microsoft.com/office/powerpoint/2010/main" val="512484925"/>
+      </p:ext>
+    </p:extLst>
+  </p:cSld>
+  <p:clrMapOvr>
+    <a:masterClrMapping/>
+  </p:clrMapOvr>
+</p:sld>
+</file>
+
 <file path=ppt/theme/theme1.xml><?xml version="1.0" encoding="utf-8"?>
 <a:theme xmlns:a="http://schemas.openxmlformats.org/drawingml/2006/main" name="Simple Light">
   <a:themeElements>

</xml_diff>